<commit_message>
update data and figure
</commit_message>
<xml_diff>
--- a/fig/fpga_preliminary.pptx
+++ b/fig/fpga_preliminary.pptx
@@ -2,18 +2,18 @@
 <file path=ppt/presentation.xml><?xml version="1.0" encoding="utf-8"?>
 <p:presentation xmlns:a="http://schemas.openxmlformats.org/drawingml/2006/main" xmlns:r="http://schemas.openxmlformats.org/officeDocument/2006/relationships" xmlns:p="http://schemas.openxmlformats.org/presentationml/2006/main" saveSubsetFonts="1">
   <p:sldMasterIdLst>
-    <p:sldMasterId id="2147483648" r:id="rId1"/>
+    <p:sldMasterId id="2147483660" r:id="rId1"/>
   </p:sldMasterIdLst>
   <p:sldIdLst>
     <p:sldId id="256" r:id="rId2"/>
   </p:sldIdLst>
-  <p:sldSz cx="12192000" cy="6858000"/>
+  <p:sldSz cx="14400213" cy="6858000"/>
   <p:notesSz cx="6858000" cy="9144000"/>
   <p:defaultTextStyle>
     <a:defPPr>
-      <a:defRPr lang="zh-CN"/>
+      <a:defRPr lang="en-US"/>
     </a:defPPr>
-    <a:lvl1pPr marL="0" algn="l" defTabSz="914400" rtl="0" eaLnBrk="1" latinLnBrk="0" hangingPunct="1">
+    <a:lvl1pPr marL="0" algn="l" defTabSz="457200" rtl="0" eaLnBrk="1" latinLnBrk="0" hangingPunct="1">
       <a:defRPr sz="1800" kern="1200">
         <a:solidFill>
           <a:schemeClr val="tx1"/>
@@ -23,7 +23,7 @@
         <a:cs typeface="+mn-cs"/>
       </a:defRPr>
     </a:lvl1pPr>
-    <a:lvl2pPr marL="457200" algn="l" defTabSz="914400" rtl="0" eaLnBrk="1" latinLnBrk="0" hangingPunct="1">
+    <a:lvl2pPr marL="457200" algn="l" defTabSz="457200" rtl="0" eaLnBrk="1" latinLnBrk="0" hangingPunct="1">
       <a:defRPr sz="1800" kern="1200">
         <a:solidFill>
           <a:schemeClr val="tx1"/>
@@ -33,7 +33,7 @@
         <a:cs typeface="+mn-cs"/>
       </a:defRPr>
     </a:lvl2pPr>
-    <a:lvl3pPr marL="914400" algn="l" defTabSz="914400" rtl="0" eaLnBrk="1" latinLnBrk="0" hangingPunct="1">
+    <a:lvl3pPr marL="914400" algn="l" defTabSz="457200" rtl="0" eaLnBrk="1" latinLnBrk="0" hangingPunct="1">
       <a:defRPr sz="1800" kern="1200">
         <a:solidFill>
           <a:schemeClr val="tx1"/>
@@ -43,7 +43,7 @@
         <a:cs typeface="+mn-cs"/>
       </a:defRPr>
     </a:lvl3pPr>
-    <a:lvl4pPr marL="1371600" algn="l" defTabSz="914400" rtl="0" eaLnBrk="1" latinLnBrk="0" hangingPunct="1">
+    <a:lvl4pPr marL="1371600" algn="l" defTabSz="457200" rtl="0" eaLnBrk="1" latinLnBrk="0" hangingPunct="1">
       <a:defRPr sz="1800" kern="1200">
         <a:solidFill>
           <a:schemeClr val="tx1"/>
@@ -53,7 +53,7 @@
         <a:cs typeface="+mn-cs"/>
       </a:defRPr>
     </a:lvl4pPr>
-    <a:lvl5pPr marL="1828800" algn="l" defTabSz="914400" rtl="0" eaLnBrk="1" latinLnBrk="0" hangingPunct="1">
+    <a:lvl5pPr marL="1828800" algn="l" defTabSz="457200" rtl="0" eaLnBrk="1" latinLnBrk="0" hangingPunct="1">
       <a:defRPr sz="1800" kern="1200">
         <a:solidFill>
           <a:schemeClr val="tx1"/>
@@ -63,7 +63,7 @@
         <a:cs typeface="+mn-cs"/>
       </a:defRPr>
     </a:lvl5pPr>
-    <a:lvl6pPr marL="2286000" algn="l" defTabSz="914400" rtl="0" eaLnBrk="1" latinLnBrk="0" hangingPunct="1">
+    <a:lvl6pPr marL="2286000" algn="l" defTabSz="457200" rtl="0" eaLnBrk="1" latinLnBrk="0" hangingPunct="1">
       <a:defRPr sz="1800" kern="1200">
         <a:solidFill>
           <a:schemeClr val="tx1"/>
@@ -73,7 +73,7 @@
         <a:cs typeface="+mn-cs"/>
       </a:defRPr>
     </a:lvl6pPr>
-    <a:lvl7pPr marL="2743200" algn="l" defTabSz="914400" rtl="0" eaLnBrk="1" latinLnBrk="0" hangingPunct="1">
+    <a:lvl7pPr marL="2743200" algn="l" defTabSz="457200" rtl="0" eaLnBrk="1" latinLnBrk="0" hangingPunct="1">
       <a:defRPr sz="1800" kern="1200">
         <a:solidFill>
           <a:schemeClr val="tx1"/>
@@ -83,7 +83,7 @@
         <a:cs typeface="+mn-cs"/>
       </a:defRPr>
     </a:lvl7pPr>
-    <a:lvl8pPr marL="3200400" algn="l" defTabSz="914400" rtl="0" eaLnBrk="1" latinLnBrk="0" hangingPunct="1">
+    <a:lvl8pPr marL="3200400" algn="l" defTabSz="457200" rtl="0" eaLnBrk="1" latinLnBrk="0" hangingPunct="1">
       <a:defRPr sz="1800" kern="1200">
         <a:solidFill>
           <a:schemeClr val="tx1"/>
@@ -93,7 +93,7 @@
         <a:cs typeface="+mn-cs"/>
       </a:defRPr>
     </a:lvl8pPr>
-    <a:lvl9pPr marL="3657600" algn="l" defTabSz="914400" rtl="0" eaLnBrk="1" latinLnBrk="0" hangingPunct="1">
+    <a:lvl9pPr marL="3657600" algn="l" defTabSz="457200" rtl="0" eaLnBrk="1" latinLnBrk="0" hangingPunct="1">
       <a:defRPr sz="1800" kern="1200">
         <a:solidFill>
           <a:schemeClr val="tx1"/>
@@ -104,7 +104,927 @@
       </a:defRPr>
     </a:lvl9pPr>
   </p:defaultTextStyle>
+  <p:extLst>
+    <p:ext uri="{EFAFB233-063F-42B5-8137-9DF3F51BA10A}">
+      <p15:sldGuideLst xmlns:p15="http://schemas.microsoft.com/office/powerpoint/2012/main"/>
+    </p:ext>
+  </p:extLst>
 </p:presentation>
+</file>
+
+<file path=ppt/charts/chart1.xml><?xml version="1.0" encoding="utf-8"?>
+<c:chartSpace xmlns:c="http://schemas.openxmlformats.org/drawingml/2006/chart" xmlns:a="http://schemas.openxmlformats.org/drawingml/2006/main" xmlns:r="http://schemas.openxmlformats.org/officeDocument/2006/relationships" xmlns:c16r2="http://schemas.microsoft.com/office/drawing/2015/06/chart">
+  <c:date1904 val="0"/>
+  <c:lang val="zh-CN"/>
+  <c:roundedCorners val="0"/>
+  <mc:AlternateContent xmlns:mc="http://schemas.openxmlformats.org/markup-compatibility/2006">
+    <mc:Choice xmlns:c14="http://schemas.microsoft.com/office/drawing/2007/8/2/chart" Requires="c14">
+      <c14:style val="102"/>
+    </mc:Choice>
+    <mc:Fallback>
+      <c:style val="2"/>
+    </mc:Fallback>
+  </mc:AlternateContent>
+  <c:chart>
+    <c:autoTitleDeleted val="1"/>
+    <c:plotArea>
+      <c:layout/>
+      <c:barChart>
+        <c:barDir val="col"/>
+        <c:grouping val="clustered"/>
+        <c:varyColors val="0"/>
+        <c:ser>
+          <c:idx val="0"/>
+          <c:order val="0"/>
+          <c:tx>
+            <c:strRef>
+              <c:f>Sheet1!$A$2</c:f>
+              <c:strCache>
+                <c:ptCount val="1"/>
+                <c:pt idx="0">
+                  <c:v>REG</c:v>
+                </c:pt>
+              </c:strCache>
+            </c:strRef>
+          </c:tx>
+          <c:spPr>
+            <a:solidFill>
+              <a:schemeClr val="accent1"/>
+            </a:solidFill>
+            <a:ln>
+              <a:noFill/>
+            </a:ln>
+            <a:effectLst/>
+          </c:spPr>
+          <c:invertIfNegative val="0"/>
+          <c:cat>
+            <c:strRef>
+              <c:f>Sheet1!$B$1:$G$1</c:f>
+              <c:strCache>
+                <c:ptCount val="6"/>
+                <c:pt idx="0">
+                  <c:v>XC7Z020</c:v>
+                </c:pt>
+                <c:pt idx="1">
+                  <c:v>5CEA7</c:v>
+                </c:pt>
+                <c:pt idx="2">
+                  <c:v>ZU9EG</c:v>
+                </c:pt>
+                <c:pt idx="3">
+                  <c:v>5SGXA7</c:v>
+                </c:pt>
+                <c:pt idx="4">
+                  <c:v>10AX115</c:v>
+                </c:pt>
+                <c:pt idx="5">
+                  <c:v>VU9P</c:v>
+                </c:pt>
+              </c:strCache>
+            </c:strRef>
+          </c:cat>
+          <c:val>
+            <c:numRef>
+              <c:f>Sheet1!$B$2:$G$2</c:f>
+              <c:numCache>
+                <c:formatCode>General</c:formatCode>
+                <c:ptCount val="6"/>
+                <c:pt idx="0">
+                  <c:v>12.98828125</c:v>
+                </c:pt>
+                <c:pt idx="1">
+                  <c:v>18.24951171875</c:v>
+                </c:pt>
+                <c:pt idx="2">
+                  <c:v>66.9140625</c:v>
+                </c:pt>
+                <c:pt idx="3">
+                  <c:v>114.609375</c:v>
+                </c:pt>
+                <c:pt idx="4">
+                  <c:v>208.59375</c:v>
+                </c:pt>
+                <c:pt idx="5">
+                  <c:v>288.6328125</c:v>
+                </c:pt>
+              </c:numCache>
+            </c:numRef>
+          </c:val>
+          <c:extLst>
+            <c:ext xmlns:c16="http://schemas.microsoft.com/office/drawing/2014/chart" uri="{C3380CC4-5D6E-409C-BE32-E72D297353CC}">
+              <c16:uniqueId val="{00000000-58DD-4FF0-B8B0-2F810351D610}"/>
+            </c:ext>
+          </c:extLst>
+        </c:ser>
+        <c:ser>
+          <c:idx val="1"/>
+          <c:order val="1"/>
+          <c:tx>
+            <c:strRef>
+              <c:f>Sheet1!$A$3</c:f>
+              <c:strCache>
+                <c:ptCount val="1"/>
+                <c:pt idx="0">
+                  <c:v>SRAM</c:v>
+                </c:pt>
+              </c:strCache>
+            </c:strRef>
+          </c:tx>
+          <c:spPr>
+            <a:solidFill>
+              <a:schemeClr val="accent2"/>
+            </a:solidFill>
+            <a:ln>
+              <a:noFill/>
+            </a:ln>
+            <a:effectLst/>
+          </c:spPr>
+          <c:invertIfNegative val="0"/>
+          <c:cat>
+            <c:strRef>
+              <c:f>Sheet1!$B$1:$G$1</c:f>
+              <c:strCache>
+                <c:ptCount val="6"/>
+                <c:pt idx="0">
+                  <c:v>XC7Z020</c:v>
+                </c:pt>
+                <c:pt idx="1">
+                  <c:v>5CEA7</c:v>
+                </c:pt>
+                <c:pt idx="2">
+                  <c:v>ZU9EG</c:v>
+                </c:pt>
+                <c:pt idx="3">
+                  <c:v>5SGXA7</c:v>
+                </c:pt>
+                <c:pt idx="4">
+                  <c:v>10AX115</c:v>
+                </c:pt>
+                <c:pt idx="5">
+                  <c:v>VU9P</c:v>
+                </c:pt>
+              </c:strCache>
+            </c:strRef>
+          </c:cat>
+          <c:val>
+            <c:numRef>
+              <c:f>Sheet1!$B$3:$G$3</c:f>
+              <c:numCache>
+                <c:formatCode>General</c:formatCode>
+                <c:ptCount val="6"/>
+                <c:pt idx="0">
+                  <c:v>630</c:v>
+                </c:pt>
+                <c:pt idx="1">
+                  <c:v>857.5</c:v>
+                </c:pt>
+                <c:pt idx="2">
+                  <c:v>4104</c:v>
+                </c:pt>
+                <c:pt idx="3">
+                  <c:v>6400</c:v>
+                </c:pt>
+                <c:pt idx="4">
+                  <c:v>6784</c:v>
+                </c:pt>
+                <c:pt idx="5">
+                  <c:v>44280</c:v>
+                </c:pt>
+              </c:numCache>
+            </c:numRef>
+          </c:val>
+          <c:extLst>
+            <c:ext xmlns:c16="http://schemas.microsoft.com/office/drawing/2014/chart" uri="{C3380CC4-5D6E-409C-BE32-E72D297353CC}">
+              <c16:uniqueId val="{00000001-58DD-4FF0-B8B0-2F810351D610}"/>
+            </c:ext>
+          </c:extLst>
+        </c:ser>
+        <c:dLbls>
+          <c:showLegendKey val="0"/>
+          <c:showVal val="0"/>
+          <c:showCatName val="0"/>
+          <c:showSerName val="0"/>
+          <c:showPercent val="0"/>
+          <c:showBubbleSize val="0"/>
+        </c:dLbls>
+        <c:gapWidth val="180"/>
+        <c:axId val="1577518624"/>
+        <c:axId val="1577519456"/>
+      </c:barChart>
+      <c:catAx>
+        <c:axId val="1577518624"/>
+        <c:scaling>
+          <c:orientation val="minMax"/>
+        </c:scaling>
+        <c:delete val="0"/>
+        <c:axPos val="b"/>
+        <c:numFmt formatCode="General" sourceLinked="1"/>
+        <c:majorTickMark val="none"/>
+        <c:minorTickMark val="none"/>
+        <c:tickLblPos val="nextTo"/>
+        <c:spPr>
+          <a:noFill/>
+          <a:ln w="9525" cap="flat" cmpd="sng" algn="ctr">
+            <a:solidFill>
+              <a:schemeClr val="tx1">
+                <a:lumMod val="15000"/>
+                <a:lumOff val="85000"/>
+              </a:schemeClr>
+            </a:solidFill>
+            <a:round/>
+          </a:ln>
+          <a:effectLst/>
+        </c:spPr>
+        <c:txPr>
+          <a:bodyPr rot="-60000000" spcFirstLastPara="1" vertOverflow="ellipsis" vert="horz" wrap="square" anchor="ctr" anchorCtr="1"/>
+          <a:lstStyle/>
+          <a:p>
+            <a:pPr>
+              <a:defRPr sz="1200" b="1" i="0" u="none" strike="noStrike" kern="1200" baseline="0">
+                <a:solidFill>
+                  <a:schemeClr val="tx1">
+                    <a:lumMod val="95000"/>
+                    <a:lumOff val="5000"/>
+                  </a:schemeClr>
+                </a:solidFill>
+                <a:latin typeface="+mn-lt"/>
+                <a:ea typeface="+mn-ea"/>
+                <a:cs typeface="+mn-cs"/>
+              </a:defRPr>
+            </a:pPr>
+            <a:endParaRPr lang="zh-CN"/>
+          </a:p>
+        </c:txPr>
+        <c:crossAx val="1577519456"/>
+        <c:crosses val="autoZero"/>
+        <c:auto val="1"/>
+        <c:lblAlgn val="ctr"/>
+        <c:lblOffset val="100"/>
+        <c:noMultiLvlLbl val="0"/>
+      </c:catAx>
+      <c:valAx>
+        <c:axId val="1577519456"/>
+        <c:scaling>
+          <c:logBase val="10"/>
+          <c:orientation val="minMax"/>
+          <c:max val="1000000"/>
+        </c:scaling>
+        <c:delete val="1"/>
+        <c:axPos val="l"/>
+        <c:majorGridlines>
+          <c:spPr>
+            <a:ln w="9525" cap="flat" cmpd="sng" algn="ctr">
+              <a:solidFill>
+                <a:schemeClr val="tx1">
+                  <a:lumMod val="15000"/>
+                  <a:lumOff val="85000"/>
+                </a:schemeClr>
+              </a:solidFill>
+              <a:round/>
+            </a:ln>
+            <a:effectLst/>
+          </c:spPr>
+        </c:majorGridlines>
+        <c:numFmt formatCode="General" sourceLinked="1"/>
+        <c:majorTickMark val="none"/>
+        <c:minorTickMark val="none"/>
+        <c:tickLblPos val="nextTo"/>
+        <c:crossAx val="1577518624"/>
+        <c:crosses val="autoZero"/>
+        <c:crossBetween val="between"/>
+      </c:valAx>
+      <c:spPr>
+        <a:noFill/>
+        <a:ln>
+          <a:noFill/>
+        </a:ln>
+        <a:effectLst/>
+      </c:spPr>
+    </c:plotArea>
+    <c:legend>
+      <c:legendPos val="tr"/>
+      <c:layout>
+        <c:manualLayout>
+          <c:xMode val="edge"/>
+          <c:yMode val="edge"/>
+          <c:x val="2.7640498964763238E-2"/>
+          <c:y val="3.2078832088026335E-3"/>
+          <c:w val="0.32394156467584984"/>
+          <c:h val="9.3051346085889927E-2"/>
+        </c:manualLayout>
+      </c:layout>
+      <c:overlay val="1"/>
+      <c:spPr>
+        <a:solidFill>
+          <a:schemeClr val="bg1"/>
+        </a:solidFill>
+        <a:ln w="19050">
+          <a:solidFill>
+            <a:schemeClr val="tx1">
+              <a:lumMod val="95000"/>
+              <a:lumOff val="5000"/>
+            </a:schemeClr>
+          </a:solidFill>
+        </a:ln>
+        <a:effectLst/>
+      </c:spPr>
+      <c:txPr>
+        <a:bodyPr rot="0" spcFirstLastPara="1" vertOverflow="ellipsis" vert="horz" wrap="square" anchor="ctr" anchorCtr="1"/>
+        <a:lstStyle/>
+        <a:p>
+          <a:pPr>
+            <a:defRPr sz="1600" b="1" i="0" u="none" strike="noStrike" kern="1200" baseline="0">
+              <a:solidFill>
+                <a:schemeClr val="tx1">
+                  <a:lumMod val="95000"/>
+                  <a:lumOff val="5000"/>
+                </a:schemeClr>
+              </a:solidFill>
+              <a:latin typeface="+mn-lt"/>
+              <a:ea typeface="+mn-ea"/>
+              <a:cs typeface="+mn-cs"/>
+            </a:defRPr>
+          </a:pPr>
+          <a:endParaRPr lang="zh-CN"/>
+        </a:p>
+      </c:txPr>
+    </c:legend>
+    <c:plotVisOnly val="1"/>
+    <c:dispBlanksAs val="gap"/>
+    <c:showDLblsOverMax val="0"/>
+  </c:chart>
+  <c:spPr>
+    <a:noFill/>
+    <a:ln>
+      <a:noFill/>
+    </a:ln>
+    <a:effectLst/>
+  </c:spPr>
+  <c:txPr>
+    <a:bodyPr/>
+    <a:lstStyle/>
+    <a:p>
+      <a:pPr>
+        <a:defRPr sz="1200" b="1">
+          <a:solidFill>
+            <a:schemeClr val="tx1">
+              <a:lumMod val="95000"/>
+              <a:lumOff val="5000"/>
+            </a:schemeClr>
+          </a:solidFill>
+          <a:latin typeface="+mn-lt"/>
+        </a:defRPr>
+      </a:pPr>
+      <a:endParaRPr lang="zh-CN"/>
+    </a:p>
+  </c:txPr>
+  <c:externalData r:id="rId3">
+    <c:autoUpdate val="0"/>
+  </c:externalData>
+</c:chartSpace>
+</file>
+
+<file path=ppt/charts/colors1.xml><?xml version="1.0" encoding="utf-8"?>
+<cs:colorStyle xmlns:cs="http://schemas.microsoft.com/office/drawing/2012/chartStyle" xmlns:a="http://schemas.openxmlformats.org/drawingml/2006/main" meth="cycle" id="10">
+  <a:schemeClr val="accent1"/>
+  <a:schemeClr val="accent2"/>
+  <a:schemeClr val="accent3"/>
+  <a:schemeClr val="accent4"/>
+  <a:schemeClr val="accent5"/>
+  <a:schemeClr val="accent6"/>
+  <cs:variation/>
+  <cs:variation>
+    <a:lumMod val="60000"/>
+  </cs:variation>
+  <cs:variation>
+    <a:lumMod val="80000"/>
+    <a:lumOff val="20000"/>
+  </cs:variation>
+  <cs:variation>
+    <a:lumMod val="80000"/>
+  </cs:variation>
+  <cs:variation>
+    <a:lumMod val="60000"/>
+    <a:lumOff val="40000"/>
+  </cs:variation>
+  <cs:variation>
+    <a:lumMod val="50000"/>
+  </cs:variation>
+  <cs:variation>
+    <a:lumMod val="70000"/>
+    <a:lumOff val="30000"/>
+  </cs:variation>
+  <cs:variation>
+    <a:lumMod val="70000"/>
+  </cs:variation>
+  <cs:variation>
+    <a:lumMod val="50000"/>
+    <a:lumOff val="50000"/>
+  </cs:variation>
+</cs:colorStyle>
+</file>
+
+<file path=ppt/charts/style1.xml><?xml version="1.0" encoding="utf-8"?>
+<cs:chartStyle xmlns:cs="http://schemas.microsoft.com/office/drawing/2012/chartStyle" xmlns:a="http://schemas.openxmlformats.org/drawingml/2006/main" id="201">
+  <cs:axisTitle>
+    <cs:lnRef idx="0"/>
+    <cs:fillRef idx="0"/>
+    <cs:effectRef idx="0"/>
+    <cs:fontRef idx="minor">
+      <a:schemeClr val="tx1">
+        <a:lumMod val="65000"/>
+        <a:lumOff val="35000"/>
+      </a:schemeClr>
+    </cs:fontRef>
+    <cs:defRPr sz="1000" kern="1200"/>
+  </cs:axisTitle>
+  <cs:categoryAxis>
+    <cs:lnRef idx="0"/>
+    <cs:fillRef idx="0"/>
+    <cs:effectRef idx="0"/>
+    <cs:fontRef idx="minor">
+      <a:schemeClr val="tx1">
+        <a:lumMod val="65000"/>
+        <a:lumOff val="35000"/>
+      </a:schemeClr>
+    </cs:fontRef>
+    <cs:spPr>
+      <a:ln w="9525" cap="flat" cmpd="sng" algn="ctr">
+        <a:solidFill>
+          <a:schemeClr val="tx1">
+            <a:lumMod val="15000"/>
+            <a:lumOff val="85000"/>
+          </a:schemeClr>
+        </a:solidFill>
+        <a:round/>
+      </a:ln>
+    </cs:spPr>
+    <cs:defRPr sz="900" kern="1200"/>
+  </cs:categoryAxis>
+  <cs:chartArea mods="allowNoFillOverride allowNoLineOverride">
+    <cs:lnRef idx="0"/>
+    <cs:fillRef idx="0"/>
+    <cs:effectRef idx="0"/>
+    <cs:fontRef idx="minor">
+      <a:schemeClr val="tx1"/>
+    </cs:fontRef>
+    <cs:spPr>
+      <a:solidFill>
+        <a:schemeClr val="bg1"/>
+      </a:solidFill>
+      <a:ln w="9525" cap="flat" cmpd="sng" algn="ctr">
+        <a:solidFill>
+          <a:schemeClr val="tx1">
+            <a:lumMod val="15000"/>
+            <a:lumOff val="85000"/>
+          </a:schemeClr>
+        </a:solidFill>
+        <a:round/>
+      </a:ln>
+    </cs:spPr>
+    <cs:defRPr sz="1000" kern="1200"/>
+  </cs:chartArea>
+  <cs:dataLabel>
+    <cs:lnRef idx="0"/>
+    <cs:fillRef idx="0"/>
+    <cs:effectRef idx="0"/>
+    <cs:fontRef idx="minor">
+      <a:schemeClr val="tx1">
+        <a:lumMod val="75000"/>
+        <a:lumOff val="25000"/>
+      </a:schemeClr>
+    </cs:fontRef>
+    <cs:defRPr sz="900" kern="1200"/>
+  </cs:dataLabel>
+  <cs:dataLabelCallout>
+    <cs:lnRef idx="0"/>
+    <cs:fillRef idx="0"/>
+    <cs:effectRef idx="0"/>
+    <cs:fontRef idx="minor">
+      <a:schemeClr val="dk1">
+        <a:lumMod val="65000"/>
+        <a:lumOff val="35000"/>
+      </a:schemeClr>
+    </cs:fontRef>
+    <cs:spPr>
+      <a:solidFill>
+        <a:schemeClr val="lt1"/>
+      </a:solidFill>
+      <a:ln>
+        <a:solidFill>
+          <a:schemeClr val="dk1">
+            <a:lumMod val="25000"/>
+            <a:lumOff val="75000"/>
+          </a:schemeClr>
+        </a:solidFill>
+      </a:ln>
+    </cs:spPr>
+    <cs:defRPr sz="900" kern="1200"/>
+    <cs:bodyPr rot="0" spcFirstLastPara="1" vertOverflow="clip" horzOverflow="clip" vert="horz" wrap="square" lIns="36576" tIns="18288" rIns="36576" bIns="18288" anchor="ctr" anchorCtr="1">
+      <a:spAutoFit/>
+    </cs:bodyPr>
+  </cs:dataLabelCallout>
+  <cs:dataPoint>
+    <cs:lnRef idx="0"/>
+    <cs:fillRef idx="1">
+      <cs:styleClr val="auto"/>
+    </cs:fillRef>
+    <cs:effectRef idx="0"/>
+    <cs:fontRef idx="minor">
+      <a:schemeClr val="tx1"/>
+    </cs:fontRef>
+  </cs:dataPoint>
+  <cs:dataPoint3D>
+    <cs:lnRef idx="0"/>
+    <cs:fillRef idx="1">
+      <cs:styleClr val="auto"/>
+    </cs:fillRef>
+    <cs:effectRef idx="0"/>
+    <cs:fontRef idx="minor">
+      <a:schemeClr val="tx1"/>
+    </cs:fontRef>
+  </cs:dataPoint3D>
+  <cs:dataPointLine>
+    <cs:lnRef idx="0">
+      <cs:styleClr val="auto"/>
+    </cs:lnRef>
+    <cs:fillRef idx="1"/>
+    <cs:effectRef idx="0"/>
+    <cs:fontRef idx="minor">
+      <a:schemeClr val="tx1"/>
+    </cs:fontRef>
+    <cs:spPr>
+      <a:ln w="28575" cap="rnd">
+        <a:solidFill>
+          <a:schemeClr val="phClr"/>
+        </a:solidFill>
+        <a:round/>
+      </a:ln>
+    </cs:spPr>
+  </cs:dataPointLine>
+  <cs:dataPointMarker>
+    <cs:lnRef idx="0">
+      <cs:styleClr val="auto"/>
+    </cs:lnRef>
+    <cs:fillRef idx="1">
+      <cs:styleClr val="auto"/>
+    </cs:fillRef>
+    <cs:effectRef idx="0"/>
+    <cs:fontRef idx="minor">
+      <a:schemeClr val="tx1"/>
+    </cs:fontRef>
+    <cs:spPr>
+      <a:ln w="9525">
+        <a:solidFill>
+          <a:schemeClr val="phClr"/>
+        </a:solidFill>
+      </a:ln>
+    </cs:spPr>
+  </cs:dataPointMarker>
+  <cs:dataPointMarkerLayout symbol="circle" size="5"/>
+  <cs:dataPointWireframe>
+    <cs:lnRef idx="0">
+      <cs:styleClr val="auto"/>
+    </cs:lnRef>
+    <cs:fillRef idx="1"/>
+    <cs:effectRef idx="0"/>
+    <cs:fontRef idx="minor">
+      <a:schemeClr val="tx1"/>
+    </cs:fontRef>
+    <cs:spPr>
+      <a:ln w="9525" cap="rnd">
+        <a:solidFill>
+          <a:schemeClr val="phClr"/>
+        </a:solidFill>
+        <a:round/>
+      </a:ln>
+    </cs:spPr>
+  </cs:dataPointWireframe>
+  <cs:dataTable>
+    <cs:lnRef idx="0"/>
+    <cs:fillRef idx="0"/>
+    <cs:effectRef idx="0"/>
+    <cs:fontRef idx="minor">
+      <a:schemeClr val="tx1">
+        <a:lumMod val="65000"/>
+        <a:lumOff val="35000"/>
+      </a:schemeClr>
+    </cs:fontRef>
+    <cs:spPr>
+      <a:noFill/>
+      <a:ln w="9525" cap="flat" cmpd="sng" algn="ctr">
+        <a:solidFill>
+          <a:schemeClr val="tx1">
+            <a:lumMod val="15000"/>
+            <a:lumOff val="85000"/>
+          </a:schemeClr>
+        </a:solidFill>
+        <a:round/>
+      </a:ln>
+    </cs:spPr>
+    <cs:defRPr sz="900" kern="1200"/>
+  </cs:dataTable>
+  <cs:downBar>
+    <cs:lnRef idx="0"/>
+    <cs:fillRef idx="0"/>
+    <cs:effectRef idx="0"/>
+    <cs:fontRef idx="minor">
+      <a:schemeClr val="dk1"/>
+    </cs:fontRef>
+    <cs:spPr>
+      <a:solidFill>
+        <a:schemeClr val="dk1">
+          <a:lumMod val="65000"/>
+          <a:lumOff val="35000"/>
+        </a:schemeClr>
+      </a:solidFill>
+      <a:ln w="9525">
+        <a:solidFill>
+          <a:schemeClr val="tx1">
+            <a:lumMod val="65000"/>
+            <a:lumOff val="35000"/>
+          </a:schemeClr>
+        </a:solidFill>
+      </a:ln>
+    </cs:spPr>
+  </cs:downBar>
+  <cs:dropLine>
+    <cs:lnRef idx="0"/>
+    <cs:fillRef idx="0"/>
+    <cs:effectRef idx="0"/>
+    <cs:fontRef idx="minor">
+      <a:schemeClr val="tx1"/>
+    </cs:fontRef>
+    <cs:spPr>
+      <a:ln w="9525" cap="flat" cmpd="sng" algn="ctr">
+        <a:solidFill>
+          <a:schemeClr val="tx1">
+            <a:lumMod val="35000"/>
+            <a:lumOff val="65000"/>
+          </a:schemeClr>
+        </a:solidFill>
+        <a:round/>
+      </a:ln>
+    </cs:spPr>
+  </cs:dropLine>
+  <cs:errorBar>
+    <cs:lnRef idx="0"/>
+    <cs:fillRef idx="0"/>
+    <cs:effectRef idx="0"/>
+    <cs:fontRef idx="minor">
+      <a:schemeClr val="tx1"/>
+    </cs:fontRef>
+    <cs:spPr>
+      <a:ln w="9525" cap="flat" cmpd="sng" algn="ctr">
+        <a:solidFill>
+          <a:schemeClr val="tx1">
+            <a:lumMod val="65000"/>
+            <a:lumOff val="35000"/>
+          </a:schemeClr>
+        </a:solidFill>
+        <a:round/>
+      </a:ln>
+    </cs:spPr>
+  </cs:errorBar>
+  <cs:floor>
+    <cs:lnRef idx="0"/>
+    <cs:fillRef idx="0"/>
+    <cs:effectRef idx="0"/>
+    <cs:fontRef idx="minor">
+      <a:schemeClr val="tx1"/>
+    </cs:fontRef>
+    <cs:spPr>
+      <a:noFill/>
+      <a:ln>
+        <a:noFill/>
+      </a:ln>
+    </cs:spPr>
+  </cs:floor>
+  <cs:gridlineMajor>
+    <cs:lnRef idx="0"/>
+    <cs:fillRef idx="0"/>
+    <cs:effectRef idx="0"/>
+    <cs:fontRef idx="minor">
+      <a:schemeClr val="tx1"/>
+    </cs:fontRef>
+    <cs:spPr>
+      <a:ln w="9525" cap="flat" cmpd="sng" algn="ctr">
+        <a:solidFill>
+          <a:schemeClr val="tx1">
+            <a:lumMod val="15000"/>
+            <a:lumOff val="85000"/>
+          </a:schemeClr>
+        </a:solidFill>
+        <a:round/>
+      </a:ln>
+    </cs:spPr>
+  </cs:gridlineMajor>
+  <cs:gridlineMinor>
+    <cs:lnRef idx="0"/>
+    <cs:fillRef idx="0"/>
+    <cs:effectRef idx="0"/>
+    <cs:fontRef idx="minor">
+      <a:schemeClr val="tx1"/>
+    </cs:fontRef>
+    <cs:spPr>
+      <a:ln w="9525" cap="flat" cmpd="sng" algn="ctr">
+        <a:solidFill>
+          <a:schemeClr val="tx1">
+            <a:lumMod val="5000"/>
+            <a:lumOff val="95000"/>
+          </a:schemeClr>
+        </a:solidFill>
+        <a:round/>
+      </a:ln>
+    </cs:spPr>
+  </cs:gridlineMinor>
+  <cs:hiLoLine>
+    <cs:lnRef idx="0"/>
+    <cs:fillRef idx="0"/>
+    <cs:effectRef idx="0"/>
+    <cs:fontRef idx="minor">
+      <a:schemeClr val="tx1"/>
+    </cs:fontRef>
+    <cs:spPr>
+      <a:ln w="9525" cap="flat" cmpd="sng" algn="ctr">
+        <a:solidFill>
+          <a:schemeClr val="tx1">
+            <a:lumMod val="75000"/>
+            <a:lumOff val="25000"/>
+          </a:schemeClr>
+        </a:solidFill>
+        <a:round/>
+      </a:ln>
+    </cs:spPr>
+  </cs:hiLoLine>
+  <cs:leaderLine>
+    <cs:lnRef idx="0"/>
+    <cs:fillRef idx="0"/>
+    <cs:effectRef idx="0"/>
+    <cs:fontRef idx="minor">
+      <a:schemeClr val="tx1"/>
+    </cs:fontRef>
+    <cs:spPr>
+      <a:ln w="9525" cap="flat" cmpd="sng" algn="ctr">
+        <a:solidFill>
+          <a:schemeClr val="tx1">
+            <a:lumMod val="35000"/>
+            <a:lumOff val="65000"/>
+          </a:schemeClr>
+        </a:solidFill>
+        <a:round/>
+      </a:ln>
+    </cs:spPr>
+  </cs:leaderLine>
+  <cs:legend>
+    <cs:lnRef idx="0"/>
+    <cs:fillRef idx="0"/>
+    <cs:effectRef idx="0"/>
+    <cs:fontRef idx="minor">
+      <a:schemeClr val="tx1">
+        <a:lumMod val="65000"/>
+        <a:lumOff val="35000"/>
+      </a:schemeClr>
+    </cs:fontRef>
+    <cs:defRPr sz="900" kern="1200"/>
+  </cs:legend>
+  <cs:plotArea mods="allowNoFillOverride allowNoLineOverride">
+    <cs:lnRef idx="0"/>
+    <cs:fillRef idx="0"/>
+    <cs:effectRef idx="0"/>
+    <cs:fontRef idx="minor">
+      <a:schemeClr val="tx1"/>
+    </cs:fontRef>
+  </cs:plotArea>
+  <cs:plotArea3D mods="allowNoFillOverride allowNoLineOverride">
+    <cs:lnRef idx="0"/>
+    <cs:fillRef idx="0"/>
+    <cs:effectRef idx="0"/>
+    <cs:fontRef idx="minor">
+      <a:schemeClr val="tx1"/>
+    </cs:fontRef>
+  </cs:plotArea3D>
+  <cs:seriesAxis>
+    <cs:lnRef idx="0"/>
+    <cs:fillRef idx="0"/>
+    <cs:effectRef idx="0"/>
+    <cs:fontRef idx="minor">
+      <a:schemeClr val="tx1">
+        <a:lumMod val="65000"/>
+        <a:lumOff val="35000"/>
+      </a:schemeClr>
+    </cs:fontRef>
+    <cs:defRPr sz="900" kern="1200"/>
+  </cs:seriesAxis>
+  <cs:seriesLine>
+    <cs:lnRef idx="0"/>
+    <cs:fillRef idx="0"/>
+    <cs:effectRef idx="0"/>
+    <cs:fontRef idx="minor">
+      <a:schemeClr val="tx1"/>
+    </cs:fontRef>
+    <cs:spPr>
+      <a:ln w="9525" cap="flat" cmpd="sng" algn="ctr">
+        <a:solidFill>
+          <a:schemeClr val="tx1">
+            <a:lumMod val="35000"/>
+            <a:lumOff val="65000"/>
+          </a:schemeClr>
+        </a:solidFill>
+        <a:round/>
+      </a:ln>
+    </cs:spPr>
+  </cs:seriesLine>
+  <cs:title>
+    <cs:lnRef idx="0"/>
+    <cs:fillRef idx="0"/>
+    <cs:effectRef idx="0"/>
+    <cs:fontRef idx="minor">
+      <a:schemeClr val="tx1">
+        <a:lumMod val="65000"/>
+        <a:lumOff val="35000"/>
+      </a:schemeClr>
+    </cs:fontRef>
+    <cs:defRPr sz="1400" b="0" kern="1200" spc="0" baseline="0"/>
+  </cs:title>
+  <cs:trendline>
+    <cs:lnRef idx="0">
+      <cs:styleClr val="auto"/>
+    </cs:lnRef>
+    <cs:fillRef idx="0"/>
+    <cs:effectRef idx="0"/>
+    <cs:fontRef idx="minor">
+      <a:schemeClr val="tx1"/>
+    </cs:fontRef>
+    <cs:spPr>
+      <a:ln w="19050" cap="rnd">
+        <a:solidFill>
+          <a:schemeClr val="phClr"/>
+        </a:solidFill>
+        <a:prstDash val="sysDot"/>
+      </a:ln>
+    </cs:spPr>
+  </cs:trendline>
+  <cs:trendlineLabel>
+    <cs:lnRef idx="0"/>
+    <cs:fillRef idx="0"/>
+    <cs:effectRef idx="0"/>
+    <cs:fontRef idx="minor">
+      <a:schemeClr val="tx1">
+        <a:lumMod val="65000"/>
+        <a:lumOff val="35000"/>
+      </a:schemeClr>
+    </cs:fontRef>
+    <cs:defRPr sz="900" kern="1200"/>
+  </cs:trendlineLabel>
+  <cs:upBar>
+    <cs:lnRef idx="0"/>
+    <cs:fillRef idx="0"/>
+    <cs:effectRef idx="0"/>
+    <cs:fontRef idx="minor">
+      <a:schemeClr val="dk1"/>
+    </cs:fontRef>
+    <cs:spPr>
+      <a:solidFill>
+        <a:schemeClr val="lt1"/>
+      </a:solidFill>
+      <a:ln w="9525">
+        <a:solidFill>
+          <a:schemeClr val="tx1">
+            <a:lumMod val="15000"/>
+            <a:lumOff val="85000"/>
+          </a:schemeClr>
+        </a:solidFill>
+      </a:ln>
+    </cs:spPr>
+  </cs:upBar>
+  <cs:valueAxis>
+    <cs:lnRef idx="0"/>
+    <cs:fillRef idx="0"/>
+    <cs:effectRef idx="0"/>
+    <cs:fontRef idx="minor">
+      <a:schemeClr val="tx1">
+        <a:lumMod val="65000"/>
+        <a:lumOff val="35000"/>
+      </a:schemeClr>
+    </cs:fontRef>
+    <cs:defRPr sz="900" kern="1200"/>
+  </cs:valueAxis>
+  <cs:wall>
+    <cs:lnRef idx="0"/>
+    <cs:fillRef idx="0"/>
+    <cs:effectRef idx="0"/>
+    <cs:fontRef idx="minor">
+      <a:schemeClr val="tx1"/>
+    </cs:fontRef>
+    <cs:spPr>
+      <a:noFill/>
+      <a:ln>
+        <a:noFill/>
+      </a:ln>
+    </cs:spPr>
+  </cs:wall>
+</cs:chartStyle>
 </file>
 
 <file path=ppt/slideLayouts/slideLayout1.xml><?xml version="1.0" encoding="utf-8"?>
@@ -126,7 +1046,7 @@
       </p:grpSpPr>
       <p:sp>
         <p:nvSpPr>
-          <p:cNvPr id="2" name="标题 1"/>
+          <p:cNvPr id="2" name="Title 1"/>
           <p:cNvSpPr>
             <a:spLocks noGrp="1"/>
           </p:cNvSpPr>
@@ -136,8 +1056,8 @@
         </p:nvSpPr>
         <p:spPr>
           <a:xfrm>
-            <a:off x="1524000" y="1122363"/>
-            <a:ext cx="9144000" cy="2387600"/>
+            <a:off x="1800027" y="1122363"/>
+            <a:ext cx="10800160" cy="2387600"/>
           </a:xfrm>
         </p:spPr>
         <p:txBody>
@@ -152,13 +1072,13 @@
               <a:rPr lang="zh-CN" altLang="en-US" smtClean="0"/>
               <a:t>单击此处编辑母版标题样式</a:t>
             </a:r>
-            <a:endParaRPr lang="zh-CN" altLang="en-US"/>
-          </a:p>
-        </p:txBody>
-      </p:sp>
-      <p:sp>
-        <p:nvSpPr>
-          <p:cNvPr id="3" name="副标题 2"/>
+            <a:endParaRPr lang="en-US" dirty="0"/>
+          </a:p>
+        </p:txBody>
+      </p:sp>
+      <p:sp>
+        <p:nvSpPr>
+          <p:cNvPr id="3" name="Subtitle 2"/>
           <p:cNvSpPr>
             <a:spLocks noGrp="1"/>
           </p:cNvSpPr>
@@ -168,8 +1088,8 @@
         </p:nvSpPr>
         <p:spPr>
           <a:xfrm>
-            <a:off x="1524000" y="3602038"/>
-            <a:ext cx="9144000" cy="1655762"/>
+            <a:off x="1800027" y="3602038"/>
+            <a:ext cx="10800160" cy="1655762"/>
           </a:xfrm>
         </p:spPr>
         <p:txBody>
@@ -217,13 +1137,13 @@
               <a:rPr lang="zh-CN" altLang="en-US" smtClean="0"/>
               <a:t>单击以编辑母版副标题样式</a:t>
             </a:r>
-            <a:endParaRPr lang="zh-CN" altLang="en-US"/>
-          </a:p>
-        </p:txBody>
-      </p:sp>
-      <p:sp>
-        <p:nvSpPr>
-          <p:cNvPr id="4" name="日期占位符 3"/>
+            <a:endParaRPr lang="en-US" dirty="0"/>
+          </a:p>
+        </p:txBody>
+      </p:sp>
+      <p:sp>
+        <p:nvSpPr>
+          <p:cNvPr id="4" name="Date Placeholder 3"/>
           <p:cNvSpPr>
             <a:spLocks noGrp="1"/>
           </p:cNvSpPr>
@@ -238,7 +1158,7 @@
           <a:p>
             <a:fld id="{2A39AC61-0971-4E11-AB81-DCA8A9D05F65}" type="datetimeFigureOut">
               <a:rPr lang="zh-CN" altLang="en-US" smtClean="0"/>
-              <a:t>2018/4/12</a:t>
+              <a:t>2018/4/16</a:t>
             </a:fld>
             <a:endParaRPr lang="zh-CN" altLang="en-US"/>
           </a:p>
@@ -246,7 +1166,7 @@
       </p:sp>
       <p:sp>
         <p:nvSpPr>
-          <p:cNvPr id="5" name="页脚占位符 4"/>
+          <p:cNvPr id="5" name="Footer Placeholder 4"/>
           <p:cNvSpPr>
             <a:spLocks noGrp="1"/>
           </p:cNvSpPr>
@@ -265,7 +1185,7 @@
       </p:sp>
       <p:sp>
         <p:nvSpPr>
-          <p:cNvPr id="6" name="灯片编号占位符 5"/>
+          <p:cNvPr id="6" name="Slide Number Placeholder 5"/>
           <p:cNvSpPr>
             <a:spLocks noGrp="1"/>
           </p:cNvSpPr>
@@ -289,7 +1209,7 @@
     </p:spTree>
     <p:extLst>
       <p:ext uri="{BB962C8B-B14F-4D97-AF65-F5344CB8AC3E}">
-        <p14:creationId xmlns:p14="http://schemas.microsoft.com/office/powerpoint/2010/main" val="3541572573"/>
+        <p14:creationId xmlns:p14="http://schemas.microsoft.com/office/powerpoint/2010/main" val="2746757704"/>
       </p:ext>
     </p:extLst>
   </p:cSld>
@@ -318,7 +1238,7 @@
       </p:grpSpPr>
       <p:sp>
         <p:nvSpPr>
-          <p:cNvPr id="2" name="标题 1"/>
+          <p:cNvPr id="2" name="Title 1"/>
           <p:cNvSpPr>
             <a:spLocks noGrp="1"/>
           </p:cNvSpPr>
@@ -335,13 +1255,13 @@
               <a:rPr lang="zh-CN" altLang="en-US" smtClean="0"/>
               <a:t>单击此处编辑母版标题样式</a:t>
             </a:r>
-            <a:endParaRPr lang="zh-CN" altLang="en-US"/>
-          </a:p>
-        </p:txBody>
-      </p:sp>
-      <p:sp>
-        <p:nvSpPr>
-          <p:cNvPr id="3" name="竖排文字占位符 2"/>
+            <a:endParaRPr lang="en-US" dirty="0"/>
+          </a:p>
+        </p:txBody>
+      </p:sp>
+      <p:sp>
+        <p:nvSpPr>
+          <p:cNvPr id="3" name="Vertical Text Placeholder 2"/>
           <p:cNvSpPr>
             <a:spLocks noGrp="1"/>
           </p:cNvSpPr>
@@ -387,13 +1307,13 @@
               <a:rPr lang="zh-CN" altLang="en-US" smtClean="0"/>
               <a:t>第五级</a:t>
             </a:r>
-            <a:endParaRPr lang="zh-CN" altLang="en-US"/>
-          </a:p>
-        </p:txBody>
-      </p:sp>
-      <p:sp>
-        <p:nvSpPr>
-          <p:cNvPr id="4" name="日期占位符 3"/>
+            <a:endParaRPr lang="en-US" dirty="0"/>
+          </a:p>
+        </p:txBody>
+      </p:sp>
+      <p:sp>
+        <p:nvSpPr>
+          <p:cNvPr id="4" name="Date Placeholder 3"/>
           <p:cNvSpPr>
             <a:spLocks noGrp="1"/>
           </p:cNvSpPr>
@@ -408,7 +1328,7 @@
           <a:p>
             <a:fld id="{2A39AC61-0971-4E11-AB81-DCA8A9D05F65}" type="datetimeFigureOut">
               <a:rPr lang="zh-CN" altLang="en-US" smtClean="0"/>
-              <a:t>2018/4/12</a:t>
+              <a:t>2018/4/16</a:t>
             </a:fld>
             <a:endParaRPr lang="zh-CN" altLang="en-US"/>
           </a:p>
@@ -416,7 +1336,7 @@
       </p:sp>
       <p:sp>
         <p:nvSpPr>
-          <p:cNvPr id="5" name="页脚占位符 4"/>
+          <p:cNvPr id="5" name="Footer Placeholder 4"/>
           <p:cNvSpPr>
             <a:spLocks noGrp="1"/>
           </p:cNvSpPr>
@@ -435,7 +1355,7 @@
       </p:sp>
       <p:sp>
         <p:nvSpPr>
-          <p:cNvPr id="6" name="灯片编号占位符 5"/>
+          <p:cNvPr id="6" name="Slide Number Placeholder 5"/>
           <p:cNvSpPr>
             <a:spLocks noGrp="1"/>
           </p:cNvSpPr>
@@ -459,7 +1379,7 @@
     </p:spTree>
     <p:extLst>
       <p:ext uri="{BB962C8B-B14F-4D97-AF65-F5344CB8AC3E}">
-        <p14:creationId xmlns:p14="http://schemas.microsoft.com/office/powerpoint/2010/main" val="3675546227"/>
+        <p14:creationId xmlns:p14="http://schemas.microsoft.com/office/powerpoint/2010/main" val="1111661133"/>
       </p:ext>
     </p:extLst>
   </p:cSld>
@@ -488,7 +1408,7 @@
       </p:grpSpPr>
       <p:sp>
         <p:nvSpPr>
-          <p:cNvPr id="2" name="竖排标题 1"/>
+          <p:cNvPr id="2" name="Vertical Title 1"/>
           <p:cNvSpPr>
             <a:spLocks noGrp="1"/>
           </p:cNvSpPr>
@@ -498,8 +1418,8 @@
         </p:nvSpPr>
         <p:spPr>
           <a:xfrm>
-            <a:off x="8724900" y="365125"/>
-            <a:ext cx="2628900" cy="5811838"/>
+            <a:off x="10305152" y="365125"/>
+            <a:ext cx="3105046" cy="5811838"/>
           </a:xfrm>
         </p:spPr>
         <p:txBody>
@@ -510,13 +1430,13 @@
               <a:rPr lang="zh-CN" altLang="en-US" smtClean="0"/>
               <a:t>单击此处编辑母版标题样式</a:t>
             </a:r>
-            <a:endParaRPr lang="zh-CN" altLang="en-US"/>
-          </a:p>
-        </p:txBody>
-      </p:sp>
-      <p:sp>
-        <p:nvSpPr>
-          <p:cNvPr id="3" name="竖排文字占位符 2"/>
+            <a:endParaRPr lang="en-US" dirty="0"/>
+          </a:p>
+        </p:txBody>
+      </p:sp>
+      <p:sp>
+        <p:nvSpPr>
+          <p:cNvPr id="3" name="Vertical Text Placeholder 2"/>
           <p:cNvSpPr>
             <a:spLocks noGrp="1"/>
           </p:cNvSpPr>
@@ -526,8 +1446,8 @@
         </p:nvSpPr>
         <p:spPr>
           <a:xfrm>
-            <a:off x="838200" y="365125"/>
-            <a:ext cx="7734300" cy="5811838"/>
+            <a:off x="990015" y="365125"/>
+            <a:ext cx="9135135" cy="5811838"/>
           </a:xfrm>
         </p:spPr>
         <p:txBody>
@@ -567,13 +1487,13 @@
               <a:rPr lang="zh-CN" altLang="en-US" smtClean="0"/>
               <a:t>第五级</a:t>
             </a:r>
-            <a:endParaRPr lang="zh-CN" altLang="en-US"/>
-          </a:p>
-        </p:txBody>
-      </p:sp>
-      <p:sp>
-        <p:nvSpPr>
-          <p:cNvPr id="4" name="日期占位符 3"/>
+            <a:endParaRPr lang="en-US" dirty="0"/>
+          </a:p>
+        </p:txBody>
+      </p:sp>
+      <p:sp>
+        <p:nvSpPr>
+          <p:cNvPr id="4" name="Date Placeholder 3"/>
           <p:cNvSpPr>
             <a:spLocks noGrp="1"/>
           </p:cNvSpPr>
@@ -588,7 +1508,7 @@
           <a:p>
             <a:fld id="{2A39AC61-0971-4E11-AB81-DCA8A9D05F65}" type="datetimeFigureOut">
               <a:rPr lang="zh-CN" altLang="en-US" smtClean="0"/>
-              <a:t>2018/4/12</a:t>
+              <a:t>2018/4/16</a:t>
             </a:fld>
             <a:endParaRPr lang="zh-CN" altLang="en-US"/>
           </a:p>
@@ -596,7 +1516,7 @@
       </p:sp>
       <p:sp>
         <p:nvSpPr>
-          <p:cNvPr id="5" name="页脚占位符 4"/>
+          <p:cNvPr id="5" name="Footer Placeholder 4"/>
           <p:cNvSpPr>
             <a:spLocks noGrp="1"/>
           </p:cNvSpPr>
@@ -615,7 +1535,7 @@
       </p:sp>
       <p:sp>
         <p:nvSpPr>
-          <p:cNvPr id="6" name="灯片编号占位符 5"/>
+          <p:cNvPr id="6" name="Slide Number Placeholder 5"/>
           <p:cNvSpPr>
             <a:spLocks noGrp="1"/>
           </p:cNvSpPr>
@@ -639,7 +1559,7 @@
     </p:spTree>
     <p:extLst>
       <p:ext uri="{BB962C8B-B14F-4D97-AF65-F5344CB8AC3E}">
-        <p14:creationId xmlns:p14="http://schemas.microsoft.com/office/powerpoint/2010/main" val="1045211826"/>
+        <p14:creationId xmlns:p14="http://schemas.microsoft.com/office/powerpoint/2010/main" val="2645344062"/>
       </p:ext>
     </p:extLst>
   </p:cSld>
@@ -668,7 +1588,7 @@
       </p:grpSpPr>
       <p:sp>
         <p:nvSpPr>
-          <p:cNvPr id="2" name="标题 1"/>
+          <p:cNvPr id="2" name="Title 1"/>
           <p:cNvSpPr>
             <a:spLocks noGrp="1"/>
           </p:cNvSpPr>
@@ -685,13 +1605,13 @@
               <a:rPr lang="zh-CN" altLang="en-US" smtClean="0"/>
               <a:t>单击此处编辑母版标题样式</a:t>
             </a:r>
-            <a:endParaRPr lang="zh-CN" altLang="en-US"/>
-          </a:p>
-        </p:txBody>
-      </p:sp>
-      <p:sp>
-        <p:nvSpPr>
-          <p:cNvPr id="3" name="内容占位符 2"/>
+            <a:endParaRPr lang="en-US" dirty="0"/>
+          </a:p>
+        </p:txBody>
+      </p:sp>
+      <p:sp>
+        <p:nvSpPr>
+          <p:cNvPr id="3" name="Content Placeholder 2"/>
           <p:cNvSpPr>
             <a:spLocks noGrp="1"/>
           </p:cNvSpPr>
@@ -737,13 +1657,13 @@
               <a:rPr lang="zh-CN" altLang="en-US" smtClean="0"/>
               <a:t>第五级</a:t>
             </a:r>
-            <a:endParaRPr lang="zh-CN" altLang="en-US"/>
-          </a:p>
-        </p:txBody>
-      </p:sp>
-      <p:sp>
-        <p:nvSpPr>
-          <p:cNvPr id="4" name="日期占位符 3"/>
+            <a:endParaRPr lang="en-US" dirty="0"/>
+          </a:p>
+        </p:txBody>
+      </p:sp>
+      <p:sp>
+        <p:nvSpPr>
+          <p:cNvPr id="4" name="Date Placeholder 3"/>
           <p:cNvSpPr>
             <a:spLocks noGrp="1"/>
           </p:cNvSpPr>
@@ -758,7 +1678,7 @@
           <a:p>
             <a:fld id="{2A39AC61-0971-4E11-AB81-DCA8A9D05F65}" type="datetimeFigureOut">
               <a:rPr lang="zh-CN" altLang="en-US" smtClean="0"/>
-              <a:t>2018/4/12</a:t>
+              <a:t>2018/4/16</a:t>
             </a:fld>
             <a:endParaRPr lang="zh-CN" altLang="en-US"/>
           </a:p>
@@ -766,7 +1686,7 @@
       </p:sp>
       <p:sp>
         <p:nvSpPr>
-          <p:cNvPr id="5" name="页脚占位符 4"/>
+          <p:cNvPr id="5" name="Footer Placeholder 4"/>
           <p:cNvSpPr>
             <a:spLocks noGrp="1"/>
           </p:cNvSpPr>
@@ -785,7 +1705,7 @@
       </p:sp>
       <p:sp>
         <p:nvSpPr>
-          <p:cNvPr id="6" name="灯片编号占位符 5"/>
+          <p:cNvPr id="6" name="Slide Number Placeholder 5"/>
           <p:cNvSpPr>
             <a:spLocks noGrp="1"/>
           </p:cNvSpPr>
@@ -809,7 +1729,7 @@
     </p:spTree>
     <p:extLst>
       <p:ext uri="{BB962C8B-B14F-4D97-AF65-F5344CB8AC3E}">
-        <p14:creationId xmlns:p14="http://schemas.microsoft.com/office/powerpoint/2010/main" val="3745028894"/>
+        <p14:creationId xmlns:p14="http://schemas.microsoft.com/office/powerpoint/2010/main" val="1318332549"/>
       </p:ext>
     </p:extLst>
   </p:cSld>
@@ -838,7 +1758,7 @@
       </p:grpSpPr>
       <p:sp>
         <p:nvSpPr>
-          <p:cNvPr id="2" name="标题 1"/>
+          <p:cNvPr id="2" name="Title 1"/>
           <p:cNvSpPr>
             <a:spLocks noGrp="1"/>
           </p:cNvSpPr>
@@ -848,8 +1768,8 @@
         </p:nvSpPr>
         <p:spPr>
           <a:xfrm>
-            <a:off x="831850" y="1709738"/>
-            <a:ext cx="10515600" cy="2852737"/>
+            <a:off x="982514" y="1709739"/>
+            <a:ext cx="12420184" cy="2852737"/>
           </a:xfrm>
         </p:spPr>
         <p:txBody>
@@ -864,13 +1784,13 @@
               <a:rPr lang="zh-CN" altLang="en-US" smtClean="0"/>
               <a:t>单击此处编辑母版标题样式</a:t>
             </a:r>
-            <a:endParaRPr lang="zh-CN" altLang="en-US"/>
-          </a:p>
-        </p:txBody>
-      </p:sp>
-      <p:sp>
-        <p:nvSpPr>
-          <p:cNvPr id="3" name="文本占位符 2"/>
+            <a:endParaRPr lang="en-US" dirty="0"/>
+          </a:p>
+        </p:txBody>
+      </p:sp>
+      <p:sp>
+        <p:nvSpPr>
+          <p:cNvPr id="3" name="Text Placeholder 2"/>
           <p:cNvSpPr>
             <a:spLocks noGrp="1"/>
           </p:cNvSpPr>
@@ -880,8 +1800,8 @@
         </p:nvSpPr>
         <p:spPr>
           <a:xfrm>
-            <a:off x="831850" y="4589463"/>
-            <a:ext cx="10515600" cy="1500187"/>
+            <a:off x="982514" y="4589464"/>
+            <a:ext cx="12420184" cy="1500187"/>
           </a:xfrm>
         </p:spPr>
         <p:txBody>
@@ -989,7 +1909,7 @@
       </p:sp>
       <p:sp>
         <p:nvSpPr>
-          <p:cNvPr id="4" name="日期占位符 3"/>
+          <p:cNvPr id="4" name="Date Placeholder 3"/>
           <p:cNvSpPr>
             <a:spLocks noGrp="1"/>
           </p:cNvSpPr>
@@ -1004,7 +1924,7 @@
           <a:p>
             <a:fld id="{2A39AC61-0971-4E11-AB81-DCA8A9D05F65}" type="datetimeFigureOut">
               <a:rPr lang="zh-CN" altLang="en-US" smtClean="0"/>
-              <a:t>2018/4/12</a:t>
+              <a:t>2018/4/16</a:t>
             </a:fld>
             <a:endParaRPr lang="zh-CN" altLang="en-US"/>
           </a:p>
@@ -1012,7 +1932,7 @@
       </p:sp>
       <p:sp>
         <p:nvSpPr>
-          <p:cNvPr id="5" name="页脚占位符 4"/>
+          <p:cNvPr id="5" name="Footer Placeholder 4"/>
           <p:cNvSpPr>
             <a:spLocks noGrp="1"/>
           </p:cNvSpPr>
@@ -1031,7 +1951,7 @@
       </p:sp>
       <p:sp>
         <p:nvSpPr>
-          <p:cNvPr id="6" name="灯片编号占位符 5"/>
+          <p:cNvPr id="6" name="Slide Number Placeholder 5"/>
           <p:cNvSpPr>
             <a:spLocks noGrp="1"/>
           </p:cNvSpPr>
@@ -1055,7 +1975,7 @@
     </p:spTree>
     <p:extLst>
       <p:ext uri="{BB962C8B-B14F-4D97-AF65-F5344CB8AC3E}">
-        <p14:creationId xmlns:p14="http://schemas.microsoft.com/office/powerpoint/2010/main" val="1380867861"/>
+        <p14:creationId xmlns:p14="http://schemas.microsoft.com/office/powerpoint/2010/main" val="3425436963"/>
       </p:ext>
     </p:extLst>
   </p:cSld>
@@ -1084,7 +2004,7 @@
       </p:grpSpPr>
       <p:sp>
         <p:nvSpPr>
-          <p:cNvPr id="2" name="标题 1"/>
+          <p:cNvPr id="2" name="Title 1"/>
           <p:cNvSpPr>
             <a:spLocks noGrp="1"/>
           </p:cNvSpPr>
@@ -1101,13 +2021,13 @@
               <a:rPr lang="zh-CN" altLang="en-US" smtClean="0"/>
               <a:t>单击此处编辑母版标题样式</a:t>
             </a:r>
-            <a:endParaRPr lang="zh-CN" altLang="en-US"/>
-          </a:p>
-        </p:txBody>
-      </p:sp>
-      <p:sp>
-        <p:nvSpPr>
-          <p:cNvPr id="3" name="内容占位符 2"/>
+            <a:endParaRPr lang="en-US" dirty="0"/>
+          </a:p>
+        </p:txBody>
+      </p:sp>
+      <p:sp>
+        <p:nvSpPr>
+          <p:cNvPr id="3" name="Content Placeholder 2"/>
           <p:cNvSpPr>
             <a:spLocks noGrp="1"/>
           </p:cNvSpPr>
@@ -1117,8 +2037,8 @@
         </p:nvSpPr>
         <p:spPr>
           <a:xfrm>
-            <a:off x="838200" y="1825625"/>
-            <a:ext cx="5181600" cy="4351338"/>
+            <a:off x="990014" y="1825625"/>
+            <a:ext cx="6120091" cy="4351338"/>
           </a:xfrm>
         </p:spPr>
         <p:txBody>
@@ -1158,13 +2078,13 @@
               <a:rPr lang="zh-CN" altLang="en-US" smtClean="0"/>
               <a:t>第五级</a:t>
             </a:r>
-            <a:endParaRPr lang="zh-CN" altLang="en-US"/>
-          </a:p>
-        </p:txBody>
-      </p:sp>
-      <p:sp>
-        <p:nvSpPr>
-          <p:cNvPr id="4" name="内容占位符 3"/>
+            <a:endParaRPr lang="en-US" dirty="0"/>
+          </a:p>
+        </p:txBody>
+      </p:sp>
+      <p:sp>
+        <p:nvSpPr>
+          <p:cNvPr id="4" name="Content Placeholder 3"/>
           <p:cNvSpPr>
             <a:spLocks noGrp="1"/>
           </p:cNvSpPr>
@@ -1174,8 +2094,8 @@
         </p:nvSpPr>
         <p:spPr>
           <a:xfrm>
-            <a:off x="6172200" y="1825625"/>
-            <a:ext cx="5181600" cy="4351338"/>
+            <a:off x="7290108" y="1825625"/>
+            <a:ext cx="6120091" cy="4351338"/>
           </a:xfrm>
         </p:spPr>
         <p:txBody>
@@ -1215,13 +2135,13 @@
               <a:rPr lang="zh-CN" altLang="en-US" smtClean="0"/>
               <a:t>第五级</a:t>
             </a:r>
-            <a:endParaRPr lang="zh-CN" altLang="en-US"/>
-          </a:p>
-        </p:txBody>
-      </p:sp>
-      <p:sp>
-        <p:nvSpPr>
-          <p:cNvPr id="5" name="日期占位符 4"/>
+            <a:endParaRPr lang="en-US" dirty="0"/>
+          </a:p>
+        </p:txBody>
+      </p:sp>
+      <p:sp>
+        <p:nvSpPr>
+          <p:cNvPr id="5" name="Date Placeholder 4"/>
           <p:cNvSpPr>
             <a:spLocks noGrp="1"/>
           </p:cNvSpPr>
@@ -1236,7 +2156,7 @@
           <a:p>
             <a:fld id="{2A39AC61-0971-4E11-AB81-DCA8A9D05F65}" type="datetimeFigureOut">
               <a:rPr lang="zh-CN" altLang="en-US" smtClean="0"/>
-              <a:t>2018/4/12</a:t>
+              <a:t>2018/4/16</a:t>
             </a:fld>
             <a:endParaRPr lang="zh-CN" altLang="en-US"/>
           </a:p>
@@ -1244,7 +2164,7 @@
       </p:sp>
       <p:sp>
         <p:nvSpPr>
-          <p:cNvPr id="6" name="页脚占位符 5"/>
+          <p:cNvPr id="6" name="Footer Placeholder 5"/>
           <p:cNvSpPr>
             <a:spLocks noGrp="1"/>
           </p:cNvSpPr>
@@ -1263,7 +2183,7 @@
       </p:sp>
       <p:sp>
         <p:nvSpPr>
-          <p:cNvPr id="7" name="灯片编号占位符 6"/>
+          <p:cNvPr id="7" name="Slide Number Placeholder 6"/>
           <p:cNvSpPr>
             <a:spLocks noGrp="1"/>
           </p:cNvSpPr>
@@ -1287,7 +2207,7 @@
     </p:spTree>
     <p:extLst>
       <p:ext uri="{BB962C8B-B14F-4D97-AF65-F5344CB8AC3E}">
-        <p14:creationId xmlns:p14="http://schemas.microsoft.com/office/powerpoint/2010/main" val="1447606993"/>
+        <p14:creationId xmlns:p14="http://schemas.microsoft.com/office/powerpoint/2010/main" val="300949183"/>
       </p:ext>
     </p:extLst>
   </p:cSld>
@@ -1316,7 +2236,7 @@
       </p:grpSpPr>
       <p:sp>
         <p:nvSpPr>
-          <p:cNvPr id="2" name="标题 1"/>
+          <p:cNvPr id="2" name="Title 1"/>
           <p:cNvSpPr>
             <a:spLocks noGrp="1"/>
           </p:cNvSpPr>
@@ -1326,8 +2246,8 @@
         </p:nvSpPr>
         <p:spPr>
           <a:xfrm>
-            <a:off x="839788" y="365125"/>
-            <a:ext cx="10515600" cy="1325563"/>
+            <a:off x="991890" y="365126"/>
+            <a:ext cx="12420184" cy="1325563"/>
           </a:xfrm>
         </p:spPr>
         <p:txBody>
@@ -1338,13 +2258,13 @@
               <a:rPr lang="zh-CN" altLang="en-US" smtClean="0"/>
               <a:t>单击此处编辑母版标题样式</a:t>
             </a:r>
-            <a:endParaRPr lang="zh-CN" altLang="en-US"/>
-          </a:p>
-        </p:txBody>
-      </p:sp>
-      <p:sp>
-        <p:nvSpPr>
-          <p:cNvPr id="3" name="文本占位符 2"/>
+            <a:endParaRPr lang="en-US" dirty="0"/>
+          </a:p>
+        </p:txBody>
+      </p:sp>
+      <p:sp>
+        <p:nvSpPr>
+          <p:cNvPr id="3" name="Text Placeholder 2"/>
           <p:cNvSpPr>
             <a:spLocks noGrp="1"/>
           </p:cNvSpPr>
@@ -1354,8 +2274,8 @@
         </p:nvSpPr>
         <p:spPr>
           <a:xfrm>
-            <a:off x="839788" y="1681163"/>
-            <a:ext cx="5157787" cy="823912"/>
+            <a:off x="991891" y="1681163"/>
+            <a:ext cx="6091965" cy="823912"/>
           </a:xfrm>
         </p:spPr>
         <p:txBody>
@@ -1409,7 +2329,7 @@
       </p:sp>
       <p:sp>
         <p:nvSpPr>
-          <p:cNvPr id="4" name="内容占位符 3"/>
+          <p:cNvPr id="4" name="Content Placeholder 3"/>
           <p:cNvSpPr>
             <a:spLocks noGrp="1"/>
           </p:cNvSpPr>
@@ -1419,8 +2339,8 @@
         </p:nvSpPr>
         <p:spPr>
           <a:xfrm>
-            <a:off x="839788" y="2505075"/>
-            <a:ext cx="5157787" cy="3684588"/>
+            <a:off x="991891" y="2505075"/>
+            <a:ext cx="6091965" cy="3684588"/>
           </a:xfrm>
         </p:spPr>
         <p:txBody>
@@ -1460,13 +2380,13 @@
               <a:rPr lang="zh-CN" altLang="en-US" smtClean="0"/>
               <a:t>第五级</a:t>
             </a:r>
-            <a:endParaRPr lang="zh-CN" altLang="en-US"/>
-          </a:p>
-        </p:txBody>
-      </p:sp>
-      <p:sp>
-        <p:nvSpPr>
-          <p:cNvPr id="5" name="文本占位符 4"/>
+            <a:endParaRPr lang="en-US" dirty="0"/>
+          </a:p>
+        </p:txBody>
+      </p:sp>
+      <p:sp>
+        <p:nvSpPr>
+          <p:cNvPr id="5" name="Text Placeholder 4"/>
           <p:cNvSpPr>
             <a:spLocks noGrp="1"/>
           </p:cNvSpPr>
@@ -1476,8 +2396,8 @@
         </p:nvSpPr>
         <p:spPr>
           <a:xfrm>
-            <a:off x="6172200" y="1681163"/>
-            <a:ext cx="5183188" cy="823912"/>
+            <a:off x="7290108" y="1681163"/>
+            <a:ext cx="6121966" cy="823912"/>
           </a:xfrm>
         </p:spPr>
         <p:txBody>
@@ -1531,7 +2451,7 @@
       </p:sp>
       <p:sp>
         <p:nvSpPr>
-          <p:cNvPr id="6" name="内容占位符 5"/>
+          <p:cNvPr id="6" name="Content Placeholder 5"/>
           <p:cNvSpPr>
             <a:spLocks noGrp="1"/>
           </p:cNvSpPr>
@@ -1541,8 +2461,8 @@
         </p:nvSpPr>
         <p:spPr>
           <a:xfrm>
-            <a:off x="6172200" y="2505075"/>
-            <a:ext cx="5183188" cy="3684588"/>
+            <a:off x="7290108" y="2505075"/>
+            <a:ext cx="6121966" cy="3684588"/>
           </a:xfrm>
         </p:spPr>
         <p:txBody>
@@ -1582,13 +2502,13 @@
               <a:rPr lang="zh-CN" altLang="en-US" smtClean="0"/>
               <a:t>第五级</a:t>
             </a:r>
-            <a:endParaRPr lang="zh-CN" altLang="en-US"/>
-          </a:p>
-        </p:txBody>
-      </p:sp>
-      <p:sp>
-        <p:nvSpPr>
-          <p:cNvPr id="7" name="日期占位符 6"/>
+            <a:endParaRPr lang="en-US" dirty="0"/>
+          </a:p>
+        </p:txBody>
+      </p:sp>
+      <p:sp>
+        <p:nvSpPr>
+          <p:cNvPr id="7" name="Date Placeholder 6"/>
           <p:cNvSpPr>
             <a:spLocks noGrp="1"/>
           </p:cNvSpPr>
@@ -1603,7 +2523,7 @@
           <a:p>
             <a:fld id="{2A39AC61-0971-4E11-AB81-DCA8A9D05F65}" type="datetimeFigureOut">
               <a:rPr lang="zh-CN" altLang="en-US" smtClean="0"/>
-              <a:t>2018/4/12</a:t>
+              <a:t>2018/4/16</a:t>
             </a:fld>
             <a:endParaRPr lang="zh-CN" altLang="en-US"/>
           </a:p>
@@ -1611,7 +2531,7 @@
       </p:sp>
       <p:sp>
         <p:nvSpPr>
-          <p:cNvPr id="8" name="页脚占位符 7"/>
+          <p:cNvPr id="8" name="Footer Placeholder 7"/>
           <p:cNvSpPr>
             <a:spLocks noGrp="1"/>
           </p:cNvSpPr>
@@ -1630,7 +2550,7 @@
       </p:sp>
       <p:sp>
         <p:nvSpPr>
-          <p:cNvPr id="9" name="灯片编号占位符 8"/>
+          <p:cNvPr id="9" name="Slide Number Placeholder 8"/>
           <p:cNvSpPr>
             <a:spLocks noGrp="1"/>
           </p:cNvSpPr>
@@ -1654,7 +2574,7 @@
     </p:spTree>
     <p:extLst>
       <p:ext uri="{BB962C8B-B14F-4D97-AF65-F5344CB8AC3E}">
-        <p14:creationId xmlns:p14="http://schemas.microsoft.com/office/powerpoint/2010/main" val="968368618"/>
+        <p14:creationId xmlns:p14="http://schemas.microsoft.com/office/powerpoint/2010/main" val="2968026368"/>
       </p:ext>
     </p:extLst>
   </p:cSld>
@@ -1683,7 +2603,7 @@
       </p:grpSpPr>
       <p:sp>
         <p:nvSpPr>
-          <p:cNvPr id="2" name="标题 1"/>
+          <p:cNvPr id="2" name="Title 1"/>
           <p:cNvSpPr>
             <a:spLocks noGrp="1"/>
           </p:cNvSpPr>
@@ -1700,13 +2620,13 @@
               <a:rPr lang="zh-CN" altLang="en-US" smtClean="0"/>
               <a:t>单击此处编辑母版标题样式</a:t>
             </a:r>
-            <a:endParaRPr lang="zh-CN" altLang="en-US"/>
-          </a:p>
-        </p:txBody>
-      </p:sp>
-      <p:sp>
-        <p:nvSpPr>
-          <p:cNvPr id="3" name="日期占位符 2"/>
+            <a:endParaRPr lang="en-US" dirty="0"/>
+          </a:p>
+        </p:txBody>
+      </p:sp>
+      <p:sp>
+        <p:nvSpPr>
+          <p:cNvPr id="3" name="Date Placeholder 2"/>
           <p:cNvSpPr>
             <a:spLocks noGrp="1"/>
           </p:cNvSpPr>
@@ -1721,7 +2641,7 @@
           <a:p>
             <a:fld id="{2A39AC61-0971-4E11-AB81-DCA8A9D05F65}" type="datetimeFigureOut">
               <a:rPr lang="zh-CN" altLang="en-US" smtClean="0"/>
-              <a:t>2018/4/12</a:t>
+              <a:t>2018/4/16</a:t>
             </a:fld>
             <a:endParaRPr lang="zh-CN" altLang="en-US"/>
           </a:p>
@@ -1729,7 +2649,7 @@
       </p:sp>
       <p:sp>
         <p:nvSpPr>
-          <p:cNvPr id="4" name="页脚占位符 3"/>
+          <p:cNvPr id="4" name="Footer Placeholder 3"/>
           <p:cNvSpPr>
             <a:spLocks noGrp="1"/>
           </p:cNvSpPr>
@@ -1748,7 +2668,7 @@
       </p:sp>
       <p:sp>
         <p:nvSpPr>
-          <p:cNvPr id="5" name="灯片编号占位符 4"/>
+          <p:cNvPr id="5" name="Slide Number Placeholder 4"/>
           <p:cNvSpPr>
             <a:spLocks noGrp="1"/>
           </p:cNvSpPr>
@@ -1772,7 +2692,7 @@
     </p:spTree>
     <p:extLst>
       <p:ext uri="{BB962C8B-B14F-4D97-AF65-F5344CB8AC3E}">
-        <p14:creationId xmlns:p14="http://schemas.microsoft.com/office/powerpoint/2010/main" val="3916359136"/>
+        <p14:creationId xmlns:p14="http://schemas.microsoft.com/office/powerpoint/2010/main" val="1476806720"/>
       </p:ext>
     </p:extLst>
   </p:cSld>
@@ -1801,7 +2721,7 @@
       </p:grpSpPr>
       <p:sp>
         <p:nvSpPr>
-          <p:cNvPr id="2" name="日期占位符 1"/>
+          <p:cNvPr id="2" name="Date Placeholder 1"/>
           <p:cNvSpPr>
             <a:spLocks noGrp="1"/>
           </p:cNvSpPr>
@@ -1816,7 +2736,7 @@
           <a:p>
             <a:fld id="{2A39AC61-0971-4E11-AB81-DCA8A9D05F65}" type="datetimeFigureOut">
               <a:rPr lang="zh-CN" altLang="en-US" smtClean="0"/>
-              <a:t>2018/4/12</a:t>
+              <a:t>2018/4/16</a:t>
             </a:fld>
             <a:endParaRPr lang="zh-CN" altLang="en-US"/>
           </a:p>
@@ -1824,7 +2744,7 @@
       </p:sp>
       <p:sp>
         <p:nvSpPr>
-          <p:cNvPr id="3" name="页脚占位符 2"/>
+          <p:cNvPr id="3" name="Footer Placeholder 2"/>
           <p:cNvSpPr>
             <a:spLocks noGrp="1"/>
           </p:cNvSpPr>
@@ -1843,7 +2763,7 @@
       </p:sp>
       <p:sp>
         <p:nvSpPr>
-          <p:cNvPr id="4" name="灯片编号占位符 3"/>
+          <p:cNvPr id="4" name="Slide Number Placeholder 3"/>
           <p:cNvSpPr>
             <a:spLocks noGrp="1"/>
           </p:cNvSpPr>
@@ -1867,7 +2787,7 @@
     </p:spTree>
     <p:extLst>
       <p:ext uri="{BB962C8B-B14F-4D97-AF65-F5344CB8AC3E}">
-        <p14:creationId xmlns:p14="http://schemas.microsoft.com/office/powerpoint/2010/main" val="273305985"/>
+        <p14:creationId xmlns:p14="http://schemas.microsoft.com/office/powerpoint/2010/main" val="3994386581"/>
       </p:ext>
     </p:extLst>
   </p:cSld>
@@ -1896,7 +2816,7 @@
       </p:grpSpPr>
       <p:sp>
         <p:nvSpPr>
-          <p:cNvPr id="2" name="标题 1"/>
+          <p:cNvPr id="2" name="Title 1"/>
           <p:cNvSpPr>
             <a:spLocks noGrp="1"/>
           </p:cNvSpPr>
@@ -1906,8 +2826,8 @@
         </p:nvSpPr>
         <p:spPr>
           <a:xfrm>
-            <a:off x="839788" y="457200"/>
-            <a:ext cx="3932237" cy="1600200"/>
+            <a:off x="991891" y="457200"/>
+            <a:ext cx="4644443" cy="1600200"/>
           </a:xfrm>
         </p:spPr>
         <p:txBody>
@@ -1922,13 +2842,13 @@
               <a:rPr lang="zh-CN" altLang="en-US" smtClean="0"/>
               <a:t>单击此处编辑母版标题样式</a:t>
             </a:r>
-            <a:endParaRPr lang="zh-CN" altLang="en-US"/>
-          </a:p>
-        </p:txBody>
-      </p:sp>
-      <p:sp>
-        <p:nvSpPr>
-          <p:cNvPr id="3" name="内容占位符 2"/>
+            <a:endParaRPr lang="en-US" dirty="0"/>
+          </a:p>
+        </p:txBody>
+      </p:sp>
+      <p:sp>
+        <p:nvSpPr>
+          <p:cNvPr id="3" name="Content Placeholder 2"/>
           <p:cNvSpPr>
             <a:spLocks noGrp="1"/>
           </p:cNvSpPr>
@@ -1938,8 +2858,8 @@
         </p:nvSpPr>
         <p:spPr>
           <a:xfrm>
-            <a:off x="5183188" y="987425"/>
-            <a:ext cx="6172200" cy="4873625"/>
+            <a:off x="6121966" y="987426"/>
+            <a:ext cx="7290108" cy="4873625"/>
           </a:xfrm>
         </p:spPr>
         <p:txBody>
@@ -2007,13 +2927,13 @@
               <a:rPr lang="zh-CN" altLang="en-US" smtClean="0"/>
               <a:t>第五级</a:t>
             </a:r>
-            <a:endParaRPr lang="zh-CN" altLang="en-US"/>
-          </a:p>
-        </p:txBody>
-      </p:sp>
-      <p:sp>
-        <p:nvSpPr>
-          <p:cNvPr id="4" name="文本占位符 3"/>
+            <a:endParaRPr lang="en-US" dirty="0"/>
+          </a:p>
+        </p:txBody>
+      </p:sp>
+      <p:sp>
+        <p:nvSpPr>
+          <p:cNvPr id="4" name="Text Placeholder 3"/>
           <p:cNvSpPr>
             <a:spLocks noGrp="1"/>
           </p:cNvSpPr>
@@ -2023,8 +2943,8 @@
         </p:nvSpPr>
         <p:spPr>
           <a:xfrm>
-            <a:off x="839788" y="2057400"/>
-            <a:ext cx="3932237" cy="3811588"/>
+            <a:off x="991891" y="2057400"/>
+            <a:ext cx="4644443" cy="3811588"/>
           </a:xfrm>
         </p:spPr>
         <p:txBody>
@@ -2078,7 +2998,7 @@
       </p:sp>
       <p:sp>
         <p:nvSpPr>
-          <p:cNvPr id="5" name="日期占位符 4"/>
+          <p:cNvPr id="5" name="Date Placeholder 4"/>
           <p:cNvSpPr>
             <a:spLocks noGrp="1"/>
           </p:cNvSpPr>
@@ -2093,7 +3013,7 @@
           <a:p>
             <a:fld id="{2A39AC61-0971-4E11-AB81-DCA8A9D05F65}" type="datetimeFigureOut">
               <a:rPr lang="zh-CN" altLang="en-US" smtClean="0"/>
-              <a:t>2018/4/12</a:t>
+              <a:t>2018/4/16</a:t>
             </a:fld>
             <a:endParaRPr lang="zh-CN" altLang="en-US"/>
           </a:p>
@@ -2101,7 +3021,7 @@
       </p:sp>
       <p:sp>
         <p:nvSpPr>
-          <p:cNvPr id="6" name="页脚占位符 5"/>
+          <p:cNvPr id="6" name="Footer Placeholder 5"/>
           <p:cNvSpPr>
             <a:spLocks noGrp="1"/>
           </p:cNvSpPr>
@@ -2120,7 +3040,7 @@
       </p:sp>
       <p:sp>
         <p:nvSpPr>
-          <p:cNvPr id="7" name="灯片编号占位符 6"/>
+          <p:cNvPr id="7" name="Slide Number Placeholder 6"/>
           <p:cNvSpPr>
             <a:spLocks noGrp="1"/>
           </p:cNvSpPr>
@@ -2144,7 +3064,7 @@
     </p:spTree>
     <p:extLst>
       <p:ext uri="{BB962C8B-B14F-4D97-AF65-F5344CB8AC3E}">
-        <p14:creationId xmlns:p14="http://schemas.microsoft.com/office/powerpoint/2010/main" val="1834875667"/>
+        <p14:creationId xmlns:p14="http://schemas.microsoft.com/office/powerpoint/2010/main" val="2770512533"/>
       </p:ext>
     </p:extLst>
   </p:cSld>
@@ -2173,7 +3093,7 @@
       </p:grpSpPr>
       <p:sp>
         <p:nvSpPr>
-          <p:cNvPr id="2" name="标题 1"/>
+          <p:cNvPr id="2" name="Title 1"/>
           <p:cNvSpPr>
             <a:spLocks noGrp="1"/>
           </p:cNvSpPr>
@@ -2183,8 +3103,8 @@
         </p:nvSpPr>
         <p:spPr>
           <a:xfrm>
-            <a:off x="839788" y="457200"/>
-            <a:ext cx="3932237" cy="1600200"/>
+            <a:off x="991891" y="457200"/>
+            <a:ext cx="4644443" cy="1600200"/>
           </a:xfrm>
         </p:spPr>
         <p:txBody>
@@ -2199,15 +3119,15 @@
               <a:rPr lang="zh-CN" altLang="en-US" smtClean="0"/>
               <a:t>单击此处编辑母版标题样式</a:t>
             </a:r>
-            <a:endParaRPr lang="zh-CN" altLang="en-US"/>
-          </a:p>
-        </p:txBody>
-      </p:sp>
-      <p:sp>
-        <p:nvSpPr>
-          <p:cNvPr id="3" name="图片占位符 2"/>
-          <p:cNvSpPr>
-            <a:spLocks noGrp="1"/>
+            <a:endParaRPr lang="en-US" dirty="0"/>
+          </a:p>
+        </p:txBody>
+      </p:sp>
+      <p:sp>
+        <p:nvSpPr>
+          <p:cNvPr id="3" name="Picture Placeholder 2"/>
+          <p:cNvSpPr>
+            <a:spLocks noGrp="1" noChangeAspect="1"/>
           </p:cNvSpPr>
           <p:nvPr>
             <p:ph type="pic" idx="1"/>
@@ -2215,8 +3135,73 @@
         </p:nvSpPr>
         <p:spPr>
           <a:xfrm>
-            <a:off x="5183188" y="987425"/>
-            <a:ext cx="6172200" cy="4873625"/>
+            <a:off x="6121966" y="987426"/>
+            <a:ext cx="7290108" cy="4873625"/>
+          </a:xfrm>
+        </p:spPr>
+        <p:txBody>
+          <a:bodyPr anchor="t"/>
+          <a:lstStyle>
+            <a:lvl1pPr marL="0" indent="0">
+              <a:buNone/>
+              <a:defRPr sz="3200"/>
+            </a:lvl1pPr>
+            <a:lvl2pPr marL="457200" indent="0">
+              <a:buNone/>
+              <a:defRPr sz="2800"/>
+            </a:lvl2pPr>
+            <a:lvl3pPr marL="914400" indent="0">
+              <a:buNone/>
+              <a:defRPr sz="2400"/>
+            </a:lvl3pPr>
+            <a:lvl4pPr marL="1371600" indent="0">
+              <a:buNone/>
+              <a:defRPr sz="2000"/>
+            </a:lvl4pPr>
+            <a:lvl5pPr marL="1828800" indent="0">
+              <a:buNone/>
+              <a:defRPr sz="2000"/>
+            </a:lvl5pPr>
+            <a:lvl6pPr marL="2286000" indent="0">
+              <a:buNone/>
+              <a:defRPr sz="2000"/>
+            </a:lvl6pPr>
+            <a:lvl7pPr marL="2743200" indent="0">
+              <a:buNone/>
+              <a:defRPr sz="2000"/>
+            </a:lvl7pPr>
+            <a:lvl8pPr marL="3200400" indent="0">
+              <a:buNone/>
+              <a:defRPr sz="2000"/>
+            </a:lvl8pPr>
+            <a:lvl9pPr marL="3657600" indent="0">
+              <a:buNone/>
+              <a:defRPr sz="2000"/>
+            </a:lvl9pPr>
+          </a:lstStyle>
+          <a:p>
+            <a:r>
+              <a:rPr lang="zh-CN" altLang="en-US" smtClean="0"/>
+              <a:t>单击图标添加图片</a:t>
+            </a:r>
+            <a:endParaRPr lang="en-US" dirty="0"/>
+          </a:p>
+        </p:txBody>
+      </p:sp>
+      <p:sp>
+        <p:nvSpPr>
+          <p:cNvPr id="4" name="Text Placeholder 3"/>
+          <p:cNvSpPr>
+            <a:spLocks noGrp="1"/>
+          </p:cNvSpPr>
+          <p:nvPr>
+            <p:ph type="body" sz="half" idx="2"/>
+          </p:nvPr>
+        </p:nvSpPr>
+        <p:spPr>
+          <a:xfrm>
+            <a:off x="991891" y="2057400"/>
+            <a:ext cx="4644443" cy="3811588"/>
           </a:xfrm>
         </p:spPr>
         <p:txBody>
@@ -2224,67 +3209,6 @@
           <a:lstStyle>
             <a:lvl1pPr marL="0" indent="0">
               <a:buNone/>
-              <a:defRPr sz="3200"/>
-            </a:lvl1pPr>
-            <a:lvl2pPr marL="457200" indent="0">
-              <a:buNone/>
-              <a:defRPr sz="2800"/>
-            </a:lvl2pPr>
-            <a:lvl3pPr marL="914400" indent="0">
-              <a:buNone/>
-              <a:defRPr sz="2400"/>
-            </a:lvl3pPr>
-            <a:lvl4pPr marL="1371600" indent="0">
-              <a:buNone/>
-              <a:defRPr sz="2000"/>
-            </a:lvl4pPr>
-            <a:lvl5pPr marL="1828800" indent="0">
-              <a:buNone/>
-              <a:defRPr sz="2000"/>
-            </a:lvl5pPr>
-            <a:lvl6pPr marL="2286000" indent="0">
-              <a:buNone/>
-              <a:defRPr sz="2000"/>
-            </a:lvl6pPr>
-            <a:lvl7pPr marL="2743200" indent="0">
-              <a:buNone/>
-              <a:defRPr sz="2000"/>
-            </a:lvl7pPr>
-            <a:lvl8pPr marL="3200400" indent="0">
-              <a:buNone/>
-              <a:defRPr sz="2000"/>
-            </a:lvl8pPr>
-            <a:lvl9pPr marL="3657600" indent="0">
-              <a:buNone/>
-              <a:defRPr sz="2000"/>
-            </a:lvl9pPr>
-          </a:lstStyle>
-          <a:p>
-            <a:endParaRPr lang="zh-CN" altLang="en-US"/>
-          </a:p>
-        </p:txBody>
-      </p:sp>
-      <p:sp>
-        <p:nvSpPr>
-          <p:cNvPr id="4" name="文本占位符 3"/>
-          <p:cNvSpPr>
-            <a:spLocks noGrp="1"/>
-          </p:cNvSpPr>
-          <p:nvPr>
-            <p:ph type="body" sz="half" idx="2"/>
-          </p:nvPr>
-        </p:nvSpPr>
-        <p:spPr>
-          <a:xfrm>
-            <a:off x="839788" y="2057400"/>
-            <a:ext cx="3932237" cy="3811588"/>
-          </a:xfrm>
-        </p:spPr>
-        <p:txBody>
-          <a:bodyPr/>
-          <a:lstStyle>
-            <a:lvl1pPr marL="0" indent="0">
-              <a:buNone/>
               <a:defRPr sz="1600"/>
             </a:lvl1pPr>
             <a:lvl2pPr marL="457200" indent="0">
@@ -2331,7 +3255,7 @@
       </p:sp>
       <p:sp>
         <p:nvSpPr>
-          <p:cNvPr id="5" name="日期占位符 4"/>
+          <p:cNvPr id="5" name="Date Placeholder 4"/>
           <p:cNvSpPr>
             <a:spLocks noGrp="1"/>
           </p:cNvSpPr>
@@ -2346,7 +3270,7 @@
           <a:p>
             <a:fld id="{2A39AC61-0971-4E11-AB81-DCA8A9D05F65}" type="datetimeFigureOut">
               <a:rPr lang="zh-CN" altLang="en-US" smtClean="0"/>
-              <a:t>2018/4/12</a:t>
+              <a:t>2018/4/16</a:t>
             </a:fld>
             <a:endParaRPr lang="zh-CN" altLang="en-US"/>
           </a:p>
@@ -2354,7 +3278,7 @@
       </p:sp>
       <p:sp>
         <p:nvSpPr>
-          <p:cNvPr id="6" name="页脚占位符 5"/>
+          <p:cNvPr id="6" name="Footer Placeholder 5"/>
           <p:cNvSpPr>
             <a:spLocks noGrp="1"/>
           </p:cNvSpPr>
@@ -2373,7 +3297,7 @@
       </p:sp>
       <p:sp>
         <p:nvSpPr>
-          <p:cNvPr id="7" name="灯片编号占位符 6"/>
+          <p:cNvPr id="7" name="Slide Number Placeholder 6"/>
           <p:cNvSpPr>
             <a:spLocks noGrp="1"/>
           </p:cNvSpPr>
@@ -2397,7 +3321,7 @@
     </p:spTree>
     <p:extLst>
       <p:ext uri="{BB962C8B-B14F-4D97-AF65-F5344CB8AC3E}">
-        <p14:creationId xmlns:p14="http://schemas.microsoft.com/office/powerpoint/2010/main" val="1899719621"/>
+        <p14:creationId xmlns:p14="http://schemas.microsoft.com/office/powerpoint/2010/main" val="151515133"/>
       </p:ext>
     </p:extLst>
   </p:cSld>
@@ -2431,7 +3355,7 @@
       </p:grpSpPr>
       <p:sp>
         <p:nvSpPr>
-          <p:cNvPr id="2" name="标题占位符 1"/>
+          <p:cNvPr id="2" name="Title Placeholder 1"/>
           <p:cNvSpPr>
             <a:spLocks noGrp="1"/>
           </p:cNvSpPr>
@@ -2441,8 +3365,8 @@
         </p:nvSpPr>
         <p:spPr>
           <a:xfrm>
-            <a:off x="838200" y="365125"/>
-            <a:ext cx="10515600" cy="1325563"/>
+            <a:off x="990015" y="365126"/>
+            <a:ext cx="12420184" cy="1325563"/>
           </a:xfrm>
           <a:prstGeom prst="rect">
             <a:avLst/>
@@ -2458,13 +3382,13 @@
               <a:rPr lang="zh-CN" altLang="en-US" smtClean="0"/>
               <a:t>单击此处编辑母版标题样式</a:t>
             </a:r>
-            <a:endParaRPr lang="zh-CN" altLang="en-US"/>
-          </a:p>
-        </p:txBody>
-      </p:sp>
-      <p:sp>
-        <p:nvSpPr>
-          <p:cNvPr id="3" name="文本占位符 2"/>
+            <a:endParaRPr lang="en-US" dirty="0"/>
+          </a:p>
+        </p:txBody>
+      </p:sp>
+      <p:sp>
+        <p:nvSpPr>
+          <p:cNvPr id="3" name="Text Placeholder 2"/>
           <p:cNvSpPr>
             <a:spLocks noGrp="1"/>
           </p:cNvSpPr>
@@ -2474,8 +3398,8 @@
         </p:nvSpPr>
         <p:spPr>
           <a:xfrm>
-            <a:off x="838200" y="1825625"/>
-            <a:ext cx="10515600" cy="4351338"/>
+            <a:off x="990015" y="1825625"/>
+            <a:ext cx="12420184" cy="4351338"/>
           </a:xfrm>
           <a:prstGeom prst="rect">
             <a:avLst/>
@@ -2520,13 +3444,13 @@
               <a:rPr lang="zh-CN" altLang="en-US" smtClean="0"/>
               <a:t>第五级</a:t>
             </a:r>
-            <a:endParaRPr lang="zh-CN" altLang="en-US"/>
-          </a:p>
-        </p:txBody>
-      </p:sp>
-      <p:sp>
-        <p:nvSpPr>
-          <p:cNvPr id="4" name="日期占位符 3"/>
+            <a:endParaRPr lang="en-US" dirty="0"/>
+          </a:p>
+        </p:txBody>
+      </p:sp>
+      <p:sp>
+        <p:nvSpPr>
+          <p:cNvPr id="4" name="Date Placeholder 3"/>
           <p:cNvSpPr>
             <a:spLocks noGrp="1"/>
           </p:cNvSpPr>
@@ -2536,8 +3460,8 @@
         </p:nvSpPr>
         <p:spPr>
           <a:xfrm>
-            <a:off x="838200" y="6356350"/>
-            <a:ext cx="2743200" cy="365125"/>
+            <a:off x="990015" y="6356351"/>
+            <a:ext cx="3240048" cy="365125"/>
           </a:xfrm>
           <a:prstGeom prst="rect">
             <a:avLst/>
@@ -2559,7 +3483,7 @@
           <a:p>
             <a:fld id="{2A39AC61-0971-4E11-AB81-DCA8A9D05F65}" type="datetimeFigureOut">
               <a:rPr lang="zh-CN" altLang="en-US" smtClean="0"/>
-              <a:t>2018/4/12</a:t>
+              <a:t>2018/4/16</a:t>
             </a:fld>
             <a:endParaRPr lang="zh-CN" altLang="en-US"/>
           </a:p>
@@ -2567,7 +3491,7 @@
       </p:sp>
       <p:sp>
         <p:nvSpPr>
-          <p:cNvPr id="5" name="页脚占位符 4"/>
+          <p:cNvPr id="5" name="Footer Placeholder 4"/>
           <p:cNvSpPr>
             <a:spLocks noGrp="1"/>
           </p:cNvSpPr>
@@ -2577,8 +3501,8 @@
         </p:nvSpPr>
         <p:spPr>
           <a:xfrm>
-            <a:off x="4038600" y="6356350"/>
-            <a:ext cx="4114800" cy="365125"/>
+            <a:off x="4770071" y="6356351"/>
+            <a:ext cx="4860072" cy="365125"/>
           </a:xfrm>
           <a:prstGeom prst="rect">
             <a:avLst/>
@@ -2604,7 +3528,7 @@
       </p:sp>
       <p:sp>
         <p:nvSpPr>
-          <p:cNvPr id="6" name="灯片编号占位符 5"/>
+          <p:cNvPr id="6" name="Slide Number Placeholder 5"/>
           <p:cNvSpPr>
             <a:spLocks noGrp="1"/>
           </p:cNvSpPr>
@@ -2614,8 +3538,8 @@
         </p:nvSpPr>
         <p:spPr>
           <a:xfrm>
-            <a:off x="8610600" y="6356350"/>
-            <a:ext cx="2743200" cy="365125"/>
+            <a:off x="10170150" y="6356351"/>
+            <a:ext cx="3240048" cy="365125"/>
           </a:xfrm>
           <a:prstGeom prst="rect">
             <a:avLst/>
@@ -2646,23 +3570,23 @@
     </p:spTree>
     <p:extLst>
       <p:ext uri="{BB962C8B-B14F-4D97-AF65-F5344CB8AC3E}">
-        <p14:creationId xmlns:p14="http://schemas.microsoft.com/office/powerpoint/2010/main" val="4134182848"/>
+        <p14:creationId xmlns:p14="http://schemas.microsoft.com/office/powerpoint/2010/main" val="2388284266"/>
       </p:ext>
     </p:extLst>
   </p:cSld>
   <p:clrMap bg1="lt1" tx1="dk1" bg2="lt2" tx2="dk2" accent1="accent1" accent2="accent2" accent3="accent3" accent4="accent4" accent5="accent5" accent6="accent6" hlink="hlink" folHlink="folHlink"/>
   <p:sldLayoutIdLst>
-    <p:sldLayoutId id="2147483649" r:id="rId1"/>
-    <p:sldLayoutId id="2147483650" r:id="rId2"/>
-    <p:sldLayoutId id="2147483651" r:id="rId3"/>
-    <p:sldLayoutId id="2147483652" r:id="rId4"/>
-    <p:sldLayoutId id="2147483653" r:id="rId5"/>
-    <p:sldLayoutId id="2147483654" r:id="rId6"/>
-    <p:sldLayoutId id="2147483655" r:id="rId7"/>
-    <p:sldLayoutId id="2147483656" r:id="rId8"/>
-    <p:sldLayoutId id="2147483657" r:id="rId9"/>
-    <p:sldLayoutId id="2147483658" r:id="rId10"/>
-    <p:sldLayoutId id="2147483659" r:id="rId11"/>
+    <p:sldLayoutId id="2147483661" r:id="rId1"/>
+    <p:sldLayoutId id="2147483662" r:id="rId2"/>
+    <p:sldLayoutId id="2147483663" r:id="rId3"/>
+    <p:sldLayoutId id="2147483664" r:id="rId4"/>
+    <p:sldLayoutId id="2147483665" r:id="rId5"/>
+    <p:sldLayoutId id="2147483666" r:id="rId6"/>
+    <p:sldLayoutId id="2147483667" r:id="rId7"/>
+    <p:sldLayoutId id="2147483668" r:id="rId8"/>
+    <p:sldLayoutId id="2147483669" r:id="rId9"/>
+    <p:sldLayoutId id="2147483670" r:id="rId10"/>
+    <p:sldLayoutId id="2147483671" r:id="rId11"/>
   </p:sldLayoutIdLst>
   <p:txStyles>
     <p:titleStyle>
@@ -2850,7 +3774,7 @@
     </p:bodyStyle>
     <p:otherStyle>
       <a:defPPr>
-        <a:defRPr lang="zh-CN"/>
+        <a:defRPr lang="en-US"/>
       </a:defPPr>
       <a:lvl1pPr marL="0" algn="l" defTabSz="914400" rtl="0" eaLnBrk="1" latinLnBrk="0" hangingPunct="1">
         <a:defRPr sz="1800" kern="1200">
@@ -2964,6 +3888,45 @@
           <a:chExt cx="0" cy="0"/>
         </a:xfrm>
       </p:grpSpPr>
+      <p:cxnSp>
+        <p:nvCxnSpPr>
+          <p:cNvPr id="13" name="直接连接符 12"/>
+          <p:cNvCxnSpPr/>
+          <p:nvPr/>
+        </p:nvCxnSpPr>
+        <p:spPr>
+          <a:xfrm>
+            <a:off x="7935843" y="2104847"/>
+            <a:ext cx="4575826" cy="0"/>
+          </a:xfrm>
+          <a:prstGeom prst="line">
+            <a:avLst/>
+          </a:prstGeom>
+          <a:ln w="19050">
+            <a:solidFill>
+              <a:schemeClr val="tx1">
+                <a:lumMod val="50000"/>
+                <a:lumOff val="50000"/>
+              </a:schemeClr>
+            </a:solidFill>
+            <a:prstDash val="dash"/>
+          </a:ln>
+        </p:spPr>
+        <p:style>
+          <a:lnRef idx="1">
+            <a:schemeClr val="accent1"/>
+          </a:lnRef>
+          <a:fillRef idx="0">
+            <a:schemeClr val="accent1"/>
+          </a:fillRef>
+          <a:effectRef idx="0">
+            <a:schemeClr val="accent1"/>
+          </a:effectRef>
+          <a:fontRef idx="minor">
+            <a:schemeClr val="tx1"/>
+          </a:fontRef>
+        </p:style>
+      </p:cxnSp>
       <p:sp>
         <p:nvSpPr>
           <p:cNvPr id="4" name="矩形 3"/>
@@ -2972,8 +3935,8 @@
         </p:nvSpPr>
         <p:spPr>
           <a:xfrm>
-            <a:off x="4026450" y="2104846"/>
-            <a:ext cx="2139351" cy="1656271"/>
+            <a:off x="4666949" y="2104847"/>
+            <a:ext cx="1950985" cy="1656271"/>
           </a:xfrm>
           <a:prstGeom prst="rect">
             <a:avLst/>
@@ -3008,7 +3971,7 @@
           <a:p>
             <a:pPr algn="ctr"/>
             <a:r>
-              <a:rPr lang="en-US" altLang="zh-CN" sz="2400" b="1" dirty="0" smtClean="0">
+              <a:rPr lang="en-US" altLang="zh-CN" sz="2400" b="1" dirty="0">
                 <a:solidFill>
                   <a:schemeClr val="accent1">
                     <a:lumMod val="50000"/>
@@ -3030,8 +3993,8 @@
         </p:nvSpPr>
         <p:spPr>
           <a:xfrm>
-            <a:off x="444259" y="2104846"/>
-            <a:ext cx="2139351" cy="1656271"/>
+            <a:off x="1265207" y="2104847"/>
+            <a:ext cx="1950985" cy="1656271"/>
           </a:xfrm>
           <a:prstGeom prst="rect">
             <a:avLst/>
@@ -3066,7 +4029,7 @@
           <a:p>
             <a:pPr algn="ctr"/>
             <a:r>
-              <a:rPr lang="en-US" altLang="zh-CN" sz="2400" b="1" dirty="0" smtClean="0">
+              <a:rPr lang="en-US" altLang="zh-CN" sz="2400" b="1" dirty="0">
                 <a:solidFill>
                   <a:schemeClr val="accent1">
                     <a:lumMod val="50000"/>
@@ -3081,7 +4044,7 @@
           <a:p>
             <a:pPr algn="ctr"/>
             <a:r>
-              <a:rPr lang="en-US" altLang="zh-CN" sz="2400" b="1" dirty="0" smtClean="0">
+              <a:rPr lang="en-US" altLang="zh-CN" sz="2400" b="1" dirty="0">
                 <a:solidFill>
                   <a:schemeClr val="accent1">
                     <a:lumMod val="50000"/>
@@ -3103,8 +4066,8 @@
         </p:nvSpPr>
         <p:spPr>
           <a:xfrm>
-            <a:off x="444259" y="4263606"/>
-            <a:ext cx="2139351" cy="894271"/>
+            <a:off x="1265207" y="4263607"/>
+            <a:ext cx="1950985" cy="894271"/>
           </a:xfrm>
           <a:prstGeom prst="rect">
             <a:avLst/>
@@ -3145,7 +4108,7 @@
           <a:p>
             <a:pPr algn="ctr"/>
             <a:r>
-              <a:rPr lang="en-US" altLang="zh-CN" b="1" dirty="0" smtClean="0">
+              <a:rPr lang="en-US" altLang="zh-CN" b="1" dirty="0">
                 <a:solidFill>
                   <a:schemeClr val="accent6">
                     <a:lumMod val="50000"/>
@@ -3171,7 +4134,7 @@
               </a:rPr>
               <a:t>Memory</a:t>
             </a:r>
-            <a:endParaRPr lang="en-US" altLang="zh-CN" b="1" dirty="0" smtClean="0">
+            <a:endParaRPr lang="en-US" altLang="zh-CN" b="1" dirty="0">
               <a:solidFill>
                 <a:schemeClr val="accent6">
                   <a:lumMod val="50000"/>
@@ -3191,8 +4154,8 @@
         </p:nvSpPr>
         <p:spPr>
           <a:xfrm>
-            <a:off x="4026450" y="4263606"/>
-            <a:ext cx="2139351" cy="894270"/>
+            <a:off x="4666949" y="4263606"/>
+            <a:ext cx="1950985" cy="894270"/>
           </a:xfrm>
           <a:prstGeom prst="rect">
             <a:avLst/>
@@ -3233,7 +4196,7 @@
           <a:p>
             <a:pPr algn="ctr"/>
             <a:r>
-              <a:rPr lang="en-US" altLang="zh-CN" b="1" dirty="0" smtClean="0">
+              <a:rPr lang="en-US" altLang="zh-CN" b="1" dirty="0">
                 <a:solidFill>
                   <a:schemeClr val="accent6">
                     <a:lumMod val="50000"/>
@@ -3259,7 +4222,7 @@
               </a:rPr>
               <a:t>Memory</a:t>
             </a:r>
-            <a:endParaRPr lang="en-US" altLang="zh-CN" b="1" dirty="0" smtClean="0">
+            <a:endParaRPr lang="en-US" altLang="zh-CN" b="1" dirty="0">
               <a:solidFill>
                 <a:schemeClr val="accent6">
                   <a:lumMod val="50000"/>
@@ -3279,7 +4242,7 @@
         </p:nvSpPr>
         <p:spPr>
           <a:xfrm>
-            <a:off x="2333625" y="3024194"/>
+            <a:off x="2984737" y="3024195"/>
             <a:ext cx="1933285" cy="474453"/>
           </a:xfrm>
           <a:prstGeom prst="leftRightArrow">
@@ -3331,7 +4294,7 @@
         </p:nvSpPr>
         <p:spPr>
           <a:xfrm rot="5400000">
-            <a:off x="1070122" y="3668203"/>
+            <a:off x="1779270" y="3668203"/>
             <a:ext cx="887624" cy="694968"/>
           </a:xfrm>
           <a:prstGeom prst="leftRightArrow">
@@ -3386,7 +4349,7 @@
         </p:nvSpPr>
         <p:spPr>
           <a:xfrm rot="5400000">
-            <a:off x="4652313" y="3668203"/>
+            <a:off x="5198629" y="3668203"/>
             <a:ext cx="887624" cy="694968"/>
           </a:xfrm>
           <a:prstGeom prst="leftRightArrow">
@@ -3441,7 +4404,7 @@
         </p:nvSpPr>
         <p:spPr>
           <a:xfrm>
-            <a:off x="405329" y="5291034"/>
+            <a:off x="1132094" y="5291034"/>
             <a:ext cx="2217210" cy="369332"/>
           </a:xfrm>
           <a:prstGeom prst="rect">
@@ -3456,7 +4419,7 @@
           <a:lstStyle/>
           <a:p>
             <a:r>
-              <a:rPr lang="en-US" altLang="zh-CN" b="1" dirty="0" smtClean="0">
+              <a:rPr lang="en-US" altLang="zh-CN" b="1" dirty="0">
                 <a:latin typeface="Calibri" panose="020F0502020204030204" pitchFamily="34" charset="0"/>
                 <a:cs typeface="Calibri" panose="020F0502020204030204" pitchFamily="34" charset="0"/>
               </a:rPr>
@@ -3477,7 +4440,7 @@
         </p:nvSpPr>
         <p:spPr>
           <a:xfrm>
-            <a:off x="3987520" y="5291034"/>
+            <a:off x="4487032" y="5291034"/>
             <a:ext cx="2217210" cy="369332"/>
           </a:xfrm>
           <a:prstGeom prst="rect">
@@ -3492,7 +4455,7 @@
           <a:lstStyle/>
           <a:p>
             <a:r>
-              <a:rPr lang="en-US" altLang="zh-CN" b="1" dirty="0" smtClean="0">
+              <a:rPr lang="en-US" altLang="zh-CN" b="1" dirty="0">
                 <a:latin typeface="Calibri" panose="020F0502020204030204" pitchFamily="34" charset="0"/>
                 <a:cs typeface="Calibri" panose="020F0502020204030204" pitchFamily="34" charset="0"/>
               </a:rPr>
@@ -3513,7 +4476,7 @@
         </p:nvSpPr>
         <p:spPr>
           <a:xfrm>
-            <a:off x="677775" y="1701369"/>
+            <a:off x="1498723" y="1701369"/>
             <a:ext cx="1672317" cy="369332"/>
           </a:xfrm>
           <a:prstGeom prst="rect">
@@ -3528,14 +4491,14 @@
           <a:lstStyle/>
           <a:p>
             <a:r>
-              <a:rPr lang="en-US" altLang="zh-CN" b="1" smtClean="0">
+              <a:rPr lang="en-US" altLang="zh-CN" b="1">
                 <a:latin typeface="Calibri" panose="020F0502020204030204" pitchFamily="34" charset="0"/>
                 <a:cs typeface="Calibri" panose="020F0502020204030204" pitchFamily="34" charset="0"/>
               </a:rPr>
               <a:t>working </a:t>
             </a:r>
             <a:r>
-              <a:rPr lang="en-US" altLang="zh-CN" b="1" dirty="0" smtClean="0">
+              <a:rPr lang="en-US" altLang="zh-CN" b="1" dirty="0">
                 <a:latin typeface="Calibri" panose="020F0502020204030204" pitchFamily="34" charset="0"/>
                 <a:cs typeface="Calibri" panose="020F0502020204030204" pitchFamily="34" charset="0"/>
               </a:rPr>
@@ -3556,7 +4519,7 @@
         </p:nvSpPr>
         <p:spPr>
           <a:xfrm>
-            <a:off x="3835619" y="1707288"/>
+            <a:off x="4476118" y="1707288"/>
             <a:ext cx="2521011" cy="369332"/>
           </a:xfrm>
           <a:prstGeom prst="rect">
@@ -3571,7 +4534,7 @@
           <a:lstStyle/>
           <a:p>
             <a:r>
-              <a:rPr lang="en-US" altLang="zh-CN" b="1" dirty="0" smtClean="0">
+              <a:rPr lang="en-US" altLang="zh-CN" b="1" dirty="0">
                 <a:latin typeface="Calibri" panose="020F0502020204030204" pitchFamily="34" charset="0"/>
                 <a:cs typeface="Calibri" panose="020F0502020204030204" pitchFamily="34" charset="0"/>
               </a:rPr>
@@ -3592,7 +4555,7 @@
         </p:nvSpPr>
         <p:spPr>
           <a:xfrm>
-            <a:off x="2781308" y="1937436"/>
+            <a:off x="3443486" y="1937437"/>
             <a:ext cx="1011624" cy="1200329"/>
           </a:xfrm>
           <a:prstGeom prst="rect">
@@ -3608,13 +4571,13 @@
           <a:p>
             <a:pPr algn="ctr"/>
             <a:r>
-              <a:rPr lang="en-US" altLang="zh-CN" b="1" dirty="0" err="1" smtClean="0">
+              <a:rPr lang="en-US" altLang="zh-CN" b="1" dirty="0" err="1">
                 <a:latin typeface="Calibri" panose="020F0502020204030204" pitchFamily="34" charset="0"/>
                 <a:cs typeface="Calibri" panose="020F0502020204030204" pitchFamily="34" charset="0"/>
               </a:rPr>
               <a:t>PCIe</a:t>
             </a:r>
-            <a:endParaRPr lang="en-US" altLang="zh-CN" b="1" dirty="0" smtClean="0">
+            <a:endParaRPr lang="en-US" altLang="zh-CN" b="1" dirty="0">
               <a:latin typeface="Calibri" panose="020F0502020204030204" pitchFamily="34" charset="0"/>
               <a:cs typeface="Calibri" panose="020F0502020204030204" pitchFamily="34" charset="0"/>
             </a:endParaRPr>
@@ -3622,7 +4585,7 @@
           <a:p>
             <a:pPr algn="ctr"/>
             <a:r>
-              <a:rPr lang="en-US" altLang="zh-CN" b="1" dirty="0" smtClean="0">
+              <a:rPr lang="en-US" altLang="zh-CN" b="1" dirty="0">
                 <a:latin typeface="Calibri" panose="020F0502020204030204" pitchFamily="34" charset="0"/>
                 <a:cs typeface="Calibri" panose="020F0502020204030204" pitchFamily="34" charset="0"/>
               </a:rPr>
@@ -3632,7 +4595,7 @@
           <a:p>
             <a:pPr algn="ctr"/>
             <a:r>
-              <a:rPr lang="en-US" altLang="zh-CN" b="1" dirty="0" smtClean="0">
+              <a:rPr lang="en-US" altLang="zh-CN" b="1" dirty="0">
                 <a:latin typeface="Calibri" panose="020F0502020204030204" pitchFamily="34" charset="0"/>
                 <a:cs typeface="Calibri" panose="020F0502020204030204" pitchFamily="34" charset="0"/>
               </a:rPr>
@@ -3663,8 +4626,8 @@
         </p:nvCxnSpPr>
         <p:spPr>
           <a:xfrm>
-            <a:off x="2038350" y="4015687"/>
-            <a:ext cx="2486025" cy="0"/>
+            <a:off x="2772275" y="4015687"/>
+            <a:ext cx="2397513" cy="0"/>
           </a:xfrm>
           <a:prstGeom prst="straightConnector1">
             <a:avLst/>
@@ -3700,7 +4663,7 @@
         </p:nvCxnSpPr>
         <p:spPr>
           <a:xfrm flipV="1">
-            <a:off x="3281362" y="4015687"/>
+            <a:off x="3951379" y="4015687"/>
             <a:ext cx="0" cy="443812"/>
           </a:xfrm>
           <a:prstGeom prst="line">
@@ -3735,7 +4698,7 @@
         </p:nvSpPr>
         <p:spPr>
           <a:xfrm>
-            <a:off x="2649233" y="4409940"/>
+            <a:off x="3279145" y="4409941"/>
             <a:ext cx="1324850" cy="646331"/>
           </a:xfrm>
           <a:prstGeom prst="rect">
@@ -3751,7 +4714,7 @@
           <a:p>
             <a:pPr algn="ctr"/>
             <a:r>
-              <a:rPr lang="en-US" altLang="zh-CN" b="1" dirty="0" smtClean="0">
+              <a:rPr lang="en-US" altLang="zh-CN" b="1" dirty="0">
                 <a:latin typeface="Calibri" panose="020F0502020204030204" pitchFamily="34" charset="0"/>
                 <a:cs typeface="Calibri" panose="020F0502020204030204" pitchFamily="34" charset="0"/>
               </a:rPr>
@@ -3761,7 +4724,7 @@
           <a:p>
             <a:pPr algn="ctr"/>
             <a:r>
-              <a:rPr lang="en-US" altLang="zh-CN" b="1" dirty="0" smtClean="0">
+              <a:rPr lang="en-US" altLang="zh-CN" b="1" dirty="0">
                 <a:latin typeface="Calibri" panose="020F0502020204030204" pitchFamily="34" charset="0"/>
                 <a:cs typeface="Calibri" panose="020F0502020204030204" pitchFamily="34" charset="0"/>
               </a:rPr>
@@ -3771,6 +4734,417 @@
               <a:latin typeface="Calibri" panose="020F0502020204030204" pitchFamily="34" charset="0"/>
               <a:cs typeface="Calibri" panose="020F0502020204030204" pitchFamily="34" charset="0"/>
             </a:endParaRPr>
+          </a:p>
+        </p:txBody>
+      </p:sp>
+      <p:graphicFrame>
+        <p:nvGraphicFramePr>
+          <p:cNvPr id="17" name="图表 16"/>
+          <p:cNvGraphicFramePr>
+            <a:graphicFrameLocks/>
+          </p:cNvGraphicFramePr>
+          <p:nvPr>
+            <p:extLst>
+              <p:ext uri="{D42A27DB-BD31-4B8C-83A1-F6EECF244321}">
+                <p14:modId xmlns:p14="http://schemas.microsoft.com/office/powerpoint/2010/main" val="204586949"/>
+              </p:ext>
+            </p:extLst>
+          </p:nvPr>
+        </p:nvGraphicFramePr>
+        <p:xfrm>
+          <a:off x="7759507" y="1781619"/>
+          <a:ext cx="4922502" cy="3958997"/>
+        </p:xfrm>
+        <a:graphic>
+          <a:graphicData uri="http://schemas.openxmlformats.org/drawingml/2006/chart">
+            <c:chart xmlns:c="http://schemas.openxmlformats.org/drawingml/2006/chart" xmlns:r="http://schemas.openxmlformats.org/officeDocument/2006/relationships" r:id="rId2"/>
+          </a:graphicData>
+        </a:graphic>
+      </p:graphicFrame>
+      <p:sp>
+        <p:nvSpPr>
+          <p:cNvPr id="2" name="文本框 1"/>
+          <p:cNvSpPr txBox="1"/>
+          <p:nvPr/>
+        </p:nvSpPr>
+        <p:spPr>
+          <a:xfrm>
+            <a:off x="7328386" y="5240440"/>
+            <a:ext cx="516488" cy="338554"/>
+          </a:xfrm>
+          <a:prstGeom prst="rect">
+            <a:avLst/>
+          </a:prstGeom>
+          <a:noFill/>
+        </p:spPr>
+        <p:txBody>
+          <a:bodyPr wrap="none" rtlCol="0">
+            <a:spAutoFit/>
+          </a:bodyPr>
+          <a:lstStyle/>
+          <a:p>
+            <a:r>
+              <a:rPr lang="en-US" altLang="zh-CN" sz="1600" b="1" dirty="0" smtClean="0"/>
+              <a:t>1KB</a:t>
+            </a:r>
+            <a:endParaRPr lang="zh-CN" altLang="en-US" sz="1600" b="1" dirty="0"/>
+          </a:p>
+        </p:txBody>
+      </p:sp>
+      <p:sp>
+        <p:nvSpPr>
+          <p:cNvPr id="22" name="文本框 21"/>
+          <p:cNvSpPr txBox="1"/>
+          <p:nvPr/>
+        </p:nvSpPr>
+        <p:spPr>
+          <a:xfrm>
+            <a:off x="7334529" y="3472889"/>
+            <a:ext cx="583814" cy="338554"/>
+          </a:xfrm>
+          <a:prstGeom prst="rect">
+            <a:avLst/>
+          </a:prstGeom>
+          <a:noFill/>
+        </p:spPr>
+        <p:txBody>
+          <a:bodyPr wrap="none" rtlCol="0">
+            <a:spAutoFit/>
+          </a:bodyPr>
+          <a:lstStyle/>
+          <a:p>
+            <a:r>
+              <a:rPr lang="en-US" altLang="zh-CN" sz="1600" b="1" dirty="0" smtClean="0"/>
+              <a:t>1MB</a:t>
+            </a:r>
+            <a:endParaRPr lang="zh-CN" altLang="en-US" sz="1600" b="1" dirty="0"/>
+          </a:p>
+        </p:txBody>
+      </p:sp>
+      <p:sp>
+        <p:nvSpPr>
+          <p:cNvPr id="23" name="文本框 22"/>
+          <p:cNvSpPr txBox="1"/>
+          <p:nvPr/>
+        </p:nvSpPr>
+        <p:spPr>
+          <a:xfrm>
+            <a:off x="7333200" y="1781619"/>
+            <a:ext cx="535724" cy="338554"/>
+          </a:xfrm>
+          <a:prstGeom prst="rect">
+            <a:avLst/>
+          </a:prstGeom>
+          <a:noFill/>
+        </p:spPr>
+        <p:txBody>
+          <a:bodyPr wrap="none" rtlCol="0">
+            <a:spAutoFit/>
+          </a:bodyPr>
+          <a:lstStyle/>
+          <a:p>
+            <a:r>
+              <a:rPr lang="en-US" altLang="zh-CN" sz="1600" b="1" dirty="0" smtClean="0"/>
+              <a:t>1GB</a:t>
+            </a:r>
+            <a:endParaRPr lang="zh-CN" altLang="en-US" sz="1600" b="1" dirty="0"/>
+          </a:p>
+        </p:txBody>
+      </p:sp>
+      <p:cxnSp>
+        <p:nvCxnSpPr>
+          <p:cNvPr id="25" name="直接连接符 24"/>
+          <p:cNvCxnSpPr/>
+          <p:nvPr/>
+        </p:nvCxnSpPr>
+        <p:spPr>
+          <a:xfrm>
+            <a:off x="7893645" y="2537601"/>
+            <a:ext cx="4618024" cy="0"/>
+          </a:xfrm>
+          <a:prstGeom prst="line">
+            <a:avLst/>
+          </a:prstGeom>
+          <a:ln w="19050">
+            <a:solidFill>
+              <a:schemeClr val="tx1">
+                <a:lumMod val="50000"/>
+                <a:lumOff val="50000"/>
+              </a:schemeClr>
+            </a:solidFill>
+            <a:prstDash val="dash"/>
+          </a:ln>
+        </p:spPr>
+        <p:style>
+          <a:lnRef idx="1">
+            <a:schemeClr val="accent1"/>
+          </a:lnRef>
+          <a:fillRef idx="0">
+            <a:schemeClr val="accent1"/>
+          </a:fillRef>
+          <a:effectRef idx="0">
+            <a:schemeClr val="accent1"/>
+          </a:effectRef>
+          <a:fontRef idx="minor">
+            <a:schemeClr val="tx1"/>
+          </a:fontRef>
+        </p:style>
+      </p:cxnSp>
+      <p:sp>
+        <p:nvSpPr>
+          <p:cNvPr id="29" name="文本框 28"/>
+          <p:cNvSpPr txBox="1"/>
+          <p:nvPr/>
+        </p:nvSpPr>
+        <p:spPr>
+          <a:xfrm>
+            <a:off x="12511669" y="1916613"/>
+            <a:ext cx="836768" cy="338554"/>
+          </a:xfrm>
+          <a:prstGeom prst="rect">
+            <a:avLst/>
+          </a:prstGeom>
+          <a:noFill/>
+        </p:spPr>
+        <p:txBody>
+          <a:bodyPr wrap="none" rtlCol="0">
+            <a:spAutoFit/>
+          </a:bodyPr>
+          <a:lstStyle/>
+          <a:p>
+            <a:r>
+              <a:rPr lang="en-US" altLang="zh-CN" sz="1600" b="1" dirty="0" smtClean="0"/>
+              <a:t>VGG-11</a:t>
+            </a:r>
+            <a:endParaRPr lang="zh-CN" altLang="en-US" sz="1600" b="1" dirty="0"/>
+          </a:p>
+        </p:txBody>
+      </p:sp>
+      <p:sp>
+        <p:nvSpPr>
+          <p:cNvPr id="32" name="文本框 31"/>
+          <p:cNvSpPr txBox="1"/>
+          <p:nvPr/>
+        </p:nvSpPr>
+        <p:spPr>
+          <a:xfrm>
+            <a:off x="12511669" y="2352935"/>
+            <a:ext cx="1058688" cy="338554"/>
+          </a:xfrm>
+          <a:prstGeom prst="rect">
+            <a:avLst/>
+          </a:prstGeom>
+          <a:noFill/>
+        </p:spPr>
+        <p:txBody>
+          <a:bodyPr wrap="none" rtlCol="0">
+            <a:spAutoFit/>
+          </a:bodyPr>
+          <a:lstStyle/>
+          <a:p>
+            <a:r>
+              <a:rPr lang="en-US" altLang="zh-CN" sz="1600" b="1" dirty="0" smtClean="0"/>
+              <a:t>ResNet-34</a:t>
+            </a:r>
+            <a:endParaRPr lang="zh-CN" altLang="en-US" sz="1600" b="1" dirty="0"/>
+          </a:p>
+        </p:txBody>
+      </p:sp>
+      <p:cxnSp>
+        <p:nvCxnSpPr>
+          <p:cNvPr id="33" name="直接连接符 32"/>
+          <p:cNvCxnSpPr/>
+          <p:nvPr/>
+        </p:nvCxnSpPr>
+        <p:spPr>
+          <a:xfrm>
+            <a:off x="7911746" y="3230526"/>
+            <a:ext cx="4618024" cy="0"/>
+          </a:xfrm>
+          <a:prstGeom prst="line">
+            <a:avLst/>
+          </a:prstGeom>
+          <a:ln w="19050">
+            <a:solidFill>
+              <a:schemeClr val="tx1">
+                <a:lumMod val="50000"/>
+                <a:lumOff val="50000"/>
+              </a:schemeClr>
+            </a:solidFill>
+            <a:prstDash val="dash"/>
+          </a:ln>
+        </p:spPr>
+        <p:style>
+          <a:lnRef idx="1">
+            <a:schemeClr val="accent1"/>
+          </a:lnRef>
+          <a:fillRef idx="0">
+            <a:schemeClr val="accent1"/>
+          </a:fillRef>
+          <a:effectRef idx="0">
+            <a:schemeClr val="accent1"/>
+          </a:effectRef>
+          <a:fontRef idx="minor">
+            <a:schemeClr val="tx1"/>
+          </a:fontRef>
+        </p:style>
+      </p:cxnSp>
+      <p:sp>
+        <p:nvSpPr>
+          <p:cNvPr id="34" name="文本框 33"/>
+          <p:cNvSpPr txBox="1"/>
+          <p:nvPr/>
+        </p:nvSpPr>
+        <p:spPr>
+          <a:xfrm>
+            <a:off x="12529770" y="3038102"/>
+            <a:ext cx="1193788" cy="338554"/>
+          </a:xfrm>
+          <a:prstGeom prst="rect">
+            <a:avLst/>
+          </a:prstGeom>
+          <a:noFill/>
+        </p:spPr>
+        <p:txBody>
+          <a:bodyPr wrap="none" rtlCol="0">
+            <a:spAutoFit/>
+          </a:bodyPr>
+          <a:lstStyle/>
+          <a:p>
+            <a:r>
+              <a:rPr lang="en-US" altLang="zh-CN" sz="1600" b="1" dirty="0" err="1" smtClean="0"/>
+              <a:t>SqueezeNet</a:t>
+            </a:r>
+            <a:endParaRPr lang="zh-CN" altLang="en-US" sz="1600" b="1" dirty="0"/>
+          </a:p>
+        </p:txBody>
+      </p:sp>
+      <p:cxnSp>
+        <p:nvCxnSpPr>
+          <p:cNvPr id="35" name="直接连接符 34"/>
+          <p:cNvCxnSpPr/>
+          <p:nvPr/>
+        </p:nvCxnSpPr>
+        <p:spPr>
+          <a:xfrm>
+            <a:off x="7893645" y="2309803"/>
+            <a:ext cx="4618024" cy="0"/>
+          </a:xfrm>
+          <a:prstGeom prst="line">
+            <a:avLst/>
+          </a:prstGeom>
+          <a:ln w="19050">
+            <a:solidFill>
+              <a:schemeClr val="tx1">
+                <a:lumMod val="50000"/>
+                <a:lumOff val="50000"/>
+              </a:schemeClr>
+            </a:solidFill>
+            <a:prstDash val="dash"/>
+          </a:ln>
+        </p:spPr>
+        <p:style>
+          <a:lnRef idx="1">
+            <a:schemeClr val="accent1"/>
+          </a:lnRef>
+          <a:fillRef idx="0">
+            <a:schemeClr val="accent1"/>
+          </a:fillRef>
+          <a:effectRef idx="0">
+            <a:schemeClr val="accent1"/>
+          </a:effectRef>
+          <a:fontRef idx="minor">
+            <a:schemeClr val="tx1"/>
+          </a:fontRef>
+        </p:style>
+      </p:cxnSp>
+      <p:sp>
+        <p:nvSpPr>
+          <p:cNvPr id="36" name="文本框 35"/>
+          <p:cNvSpPr txBox="1"/>
+          <p:nvPr/>
+        </p:nvSpPr>
+        <p:spPr>
+          <a:xfrm>
+            <a:off x="12511669" y="2125137"/>
+            <a:ext cx="1162882" cy="338554"/>
+          </a:xfrm>
+          <a:prstGeom prst="rect">
+            <a:avLst/>
+          </a:prstGeom>
+          <a:noFill/>
+        </p:spPr>
+        <p:txBody>
+          <a:bodyPr wrap="none" rtlCol="0">
+            <a:spAutoFit/>
+          </a:bodyPr>
+          <a:lstStyle/>
+          <a:p>
+            <a:r>
+              <a:rPr lang="en-US" altLang="zh-CN" sz="1600" b="1" dirty="0" smtClean="0"/>
+              <a:t>ResNet-152</a:t>
+            </a:r>
+            <a:endParaRPr lang="zh-CN" altLang="en-US" sz="1600" b="1" dirty="0"/>
+          </a:p>
+        </p:txBody>
+      </p:sp>
+      <p:sp>
+        <p:nvSpPr>
+          <p:cNvPr id="37" name="文本框 36"/>
+          <p:cNvSpPr txBox="1"/>
+          <p:nvPr/>
+        </p:nvSpPr>
+        <p:spPr>
+          <a:xfrm>
+            <a:off x="3697267" y="5660366"/>
+            <a:ext cx="442750" cy="369332"/>
+          </a:xfrm>
+          <a:prstGeom prst="rect">
+            <a:avLst/>
+          </a:prstGeom>
+          <a:noFill/>
+        </p:spPr>
+        <p:txBody>
+          <a:bodyPr wrap="none" rtlCol="0">
+            <a:spAutoFit/>
+          </a:bodyPr>
+          <a:lstStyle/>
+          <a:p>
+            <a:r>
+              <a:rPr lang="en-US" altLang="zh-CN" b="1" dirty="0" smtClean="0"/>
+              <a:t>(a)</a:t>
+            </a:r>
+            <a:endParaRPr lang="zh-CN" altLang="en-US" b="1" dirty="0"/>
+          </a:p>
+        </p:txBody>
+      </p:sp>
+      <p:sp>
+        <p:nvSpPr>
+          <p:cNvPr id="38" name="文本框 37"/>
+          <p:cNvSpPr txBox="1"/>
+          <p:nvPr/>
+        </p:nvSpPr>
+        <p:spPr>
+          <a:xfrm>
+            <a:off x="10102357" y="5658428"/>
+            <a:ext cx="452368" cy="369332"/>
+          </a:xfrm>
+          <a:prstGeom prst="rect">
+            <a:avLst/>
+          </a:prstGeom>
+          <a:noFill/>
+        </p:spPr>
+        <p:txBody>
+          <a:bodyPr wrap="none" rtlCol="0">
+            <a:spAutoFit/>
+          </a:bodyPr>
+          <a:lstStyle/>
+          <a:p>
+            <a:r>
+              <a:rPr lang="en-US" altLang="zh-CN" b="1" dirty="0" smtClean="0"/>
+              <a:t>(b)</a:t>
+            </a:r>
+            <a:endParaRPr lang="zh-CN" altLang="en-US" b="1" dirty="0"/>
           </a:p>
         </p:txBody>
       </p:sp>
@@ -3790,7 +5164,7 @@
 <file path=ppt/theme/theme1.xml><?xml version="1.0" encoding="utf-8"?>
 <a:theme xmlns:a="http://schemas.openxmlformats.org/drawingml/2006/main" name="Office 主题​​">
   <a:themeElements>
-    <a:clrScheme name="Office">
+    <a:clrScheme name="Office 主题​​">
       <a:dk1>
         <a:sysClr val="windowText" lastClr="000000"/>
       </a:dk1>
@@ -3828,9 +5202,9 @@
         <a:srgbClr val="954F72"/>
       </a:folHlink>
     </a:clrScheme>
-    <a:fontScheme name="Office">
+    <a:fontScheme name="Office 主题​​">
       <a:majorFont>
-        <a:latin typeface="等线 Light" panose="020F0302020204030204"/>
+        <a:latin typeface="Calibri Light" panose="020F0302020204030204"/>
         <a:ea typeface=""/>
         <a:cs typeface=""/>
         <a:font script="Jpan" typeface="游ゴシック Light"/>
@@ -3865,7 +5239,7 @@
         <a:font script="Geor" typeface="Sylfaen"/>
       </a:majorFont>
       <a:minorFont>
-        <a:latin typeface="等线" panose="020F0502020204030204"/>
+        <a:latin typeface="Calibri" panose="020F0502020204030204"/>
         <a:ea typeface=""/>
         <a:cs typeface=""/>
         <a:font script="Jpan" typeface="游ゴシック"/>
@@ -3900,7 +5274,7 @@
         <a:font script="Geor" typeface="Sylfaen"/>
       </a:minorFont>
     </a:fontScheme>
-    <a:fmtScheme name="Office">
+    <a:fmtScheme name="Office 主题​​">
       <a:fillStyleLst>
         <a:solidFill>
           <a:schemeClr val="phClr"/>

</xml_diff>